<commit_message>
linh vuc nghien cuu
</commit_message>
<xml_diff>
--- a/screen-ui-design/screen-ui-design.pptx
+++ b/screen-ui-design/screen-ui-design.pptx
@@ -25,7 +25,11 @@
     <p:sldId id="270" r:id="rId19"/>
     <p:sldId id="271" r:id="rId20"/>
     <p:sldId id="272" r:id="rId21"/>
-    <p:sldId id="257" r:id="rId22"/>
+    <p:sldId id="277" r:id="rId22"/>
+    <p:sldId id="278" r:id="rId23"/>
+    <p:sldId id="279" r:id="rId24"/>
+    <p:sldId id="280" r:id="rId25"/>
+    <p:sldId id="257" r:id="rId26"/>
   </p:sldIdLst>
   <p:sldSz cx="9144000" cy="6858000" type="screen4x3"/>
   <p:notesSz cx="6858000" cy="9144000"/>
@@ -308,7 +312,7 @@
           <a:p>
             <a:fld id="{3E183719-C579-4506-B155-4D1F9EE2F321}" type="datetimeFigureOut">
               <a:rPr lang="en-GB" smtClean="0"/>
-              <a:t>09/11/2017</a:t>
+              <a:t>03/02/2018</a:t>
             </a:fld>
             <a:endParaRPr lang="en-GB"/>
           </a:p>
@@ -478,7 +482,7 @@
           <a:p>
             <a:fld id="{3E183719-C579-4506-B155-4D1F9EE2F321}" type="datetimeFigureOut">
               <a:rPr lang="en-GB" smtClean="0"/>
-              <a:t>09/11/2017</a:t>
+              <a:t>03/02/2018</a:t>
             </a:fld>
             <a:endParaRPr lang="en-GB"/>
           </a:p>
@@ -658,7 +662,7 @@
           <a:p>
             <a:fld id="{3E183719-C579-4506-B155-4D1F9EE2F321}" type="datetimeFigureOut">
               <a:rPr lang="en-GB" smtClean="0"/>
-              <a:t>09/11/2017</a:t>
+              <a:t>03/02/2018</a:t>
             </a:fld>
             <a:endParaRPr lang="en-GB"/>
           </a:p>
@@ -828,7 +832,7 @@
           <a:p>
             <a:fld id="{3E183719-C579-4506-B155-4D1F9EE2F321}" type="datetimeFigureOut">
               <a:rPr lang="en-GB" smtClean="0"/>
-              <a:t>09/11/2017</a:t>
+              <a:t>03/02/2018</a:t>
             </a:fld>
             <a:endParaRPr lang="en-GB"/>
           </a:p>
@@ -1074,7 +1078,7 @@
           <a:p>
             <a:fld id="{3E183719-C579-4506-B155-4D1F9EE2F321}" type="datetimeFigureOut">
               <a:rPr lang="en-GB" smtClean="0"/>
-              <a:t>09/11/2017</a:t>
+              <a:t>03/02/2018</a:t>
             </a:fld>
             <a:endParaRPr lang="en-GB"/>
           </a:p>
@@ -1362,7 +1366,7 @@
           <a:p>
             <a:fld id="{3E183719-C579-4506-B155-4D1F9EE2F321}" type="datetimeFigureOut">
               <a:rPr lang="en-GB" smtClean="0"/>
-              <a:t>09/11/2017</a:t>
+              <a:t>03/02/2018</a:t>
             </a:fld>
             <a:endParaRPr lang="en-GB"/>
           </a:p>
@@ -1784,7 +1788,7 @@
           <a:p>
             <a:fld id="{3E183719-C579-4506-B155-4D1F9EE2F321}" type="datetimeFigureOut">
               <a:rPr lang="en-GB" smtClean="0"/>
-              <a:t>09/11/2017</a:t>
+              <a:t>03/02/2018</a:t>
             </a:fld>
             <a:endParaRPr lang="en-GB"/>
           </a:p>
@@ -1902,7 +1906,7 @@
           <a:p>
             <a:fld id="{3E183719-C579-4506-B155-4D1F9EE2F321}" type="datetimeFigureOut">
               <a:rPr lang="en-GB" smtClean="0"/>
-              <a:t>09/11/2017</a:t>
+              <a:t>03/02/2018</a:t>
             </a:fld>
             <a:endParaRPr lang="en-GB"/>
           </a:p>
@@ -1997,7 +2001,7 @@
           <a:p>
             <a:fld id="{3E183719-C579-4506-B155-4D1F9EE2F321}" type="datetimeFigureOut">
               <a:rPr lang="en-GB" smtClean="0"/>
-              <a:t>09/11/2017</a:t>
+              <a:t>03/02/2018</a:t>
             </a:fld>
             <a:endParaRPr lang="en-GB"/>
           </a:p>
@@ -2274,7 +2278,7 @@
           <a:p>
             <a:fld id="{3E183719-C579-4506-B155-4D1F9EE2F321}" type="datetimeFigureOut">
               <a:rPr lang="en-GB" smtClean="0"/>
-              <a:t>09/11/2017</a:t>
+              <a:t>03/02/2018</a:t>
             </a:fld>
             <a:endParaRPr lang="en-GB"/>
           </a:p>
@@ -2527,7 +2531,7 @@
           <a:p>
             <a:fld id="{3E183719-C579-4506-B155-4D1F9EE2F321}" type="datetimeFigureOut">
               <a:rPr lang="en-GB" smtClean="0"/>
-              <a:t>09/11/2017</a:t>
+              <a:t>03/02/2018</a:t>
             </a:fld>
             <a:endParaRPr lang="en-GB"/>
           </a:p>
@@ -2740,7 +2744,7 @@
           <a:p>
             <a:fld id="{3E183719-C579-4506-B155-4D1F9EE2F321}" type="datetimeFigureOut">
               <a:rPr lang="en-GB" smtClean="0"/>
-              <a:t>09/11/2017</a:t>
+              <a:t>03/02/2018</a:t>
             </a:fld>
             <a:endParaRPr lang="en-GB"/>
           </a:p>
@@ -9069,13 +9073,8 @@
           <a:p>
             <a:r>
               <a:rPr lang="en-GB"/>
-              <a:t>Mã nhóm </a:t>
-            </a:r>
-            <a:r>
-              <a:rPr lang="en-GB"/>
-              <a:t>quyền</a:t>
-            </a:r>
-            <a:endParaRPr lang="en-GB"/>
+              <a:t>Mã nhóm quyền</a:t>
+            </a:r>
           </a:p>
         </p:txBody>
       </p:sp>
@@ -9147,13 +9146,8 @@
           <a:p>
             <a:r>
               <a:rPr lang="en-GB"/>
-              <a:t>Tên nhóm </a:t>
-            </a:r>
-            <a:r>
-              <a:rPr lang="en-GB"/>
-              <a:t>quyền</a:t>
-            </a:r>
-            <a:endParaRPr lang="en-GB"/>
+              <a:t>Tên nhóm quyền</a:t>
+            </a:r>
           </a:p>
         </p:txBody>
       </p:sp>
@@ -9181,13 +9175,8 @@
           <a:p>
             <a:r>
               <a:rPr lang="en-GB" sz="2400"/>
-              <a:t>Thêm mới nhóm </a:t>
-            </a:r>
-            <a:r>
-              <a:rPr lang="en-GB" sz="2400"/>
-              <a:t>quyền</a:t>
-            </a:r>
-            <a:endParaRPr lang="en-GB" sz="2400"/>
+              <a:t>Thêm mới nhóm quyền</a:t>
+            </a:r>
           </a:p>
         </p:txBody>
       </p:sp>
@@ -10286,15 +10275,7 @@
           <a:p>
             <a:r>
               <a:rPr lang="en-GB" sz="2400"/>
-              <a:t>Nhóm </a:t>
-            </a:r>
-            <a:r>
-              <a:rPr lang="en-GB" sz="2400"/>
-              <a:t>quyền </a:t>
-            </a:r>
-            <a:r>
-              <a:rPr lang="en-GB" sz="2400"/>
-              <a:t>- </a:t>
+              <a:t>Nhóm quyền - </a:t>
             </a:r>
             <a:r>
               <a:rPr lang="en-GB" sz="2400" smtClean="0"/>
@@ -11312,15 +11293,7 @@
           <a:p>
             <a:r>
               <a:rPr lang="en-GB" sz="2400"/>
-              <a:t>Nhóm </a:t>
-            </a:r>
-            <a:r>
-              <a:rPr lang="en-GB" sz="2400"/>
-              <a:t>quyền </a:t>
-            </a:r>
-            <a:r>
-              <a:rPr lang="en-GB" sz="2400"/>
-              <a:t>- </a:t>
+              <a:t>Nhóm quyền - </a:t>
             </a:r>
             <a:r>
               <a:rPr lang="en-GB" sz="2400" smtClean="0"/>
@@ -11334,7 +11307,6 @@
               <a:rPr lang="en-GB" sz="2400"/>
               <a:t> dùng</a:t>
             </a:r>
-            <a:endParaRPr lang="en-GB" sz="2400"/>
           </a:p>
         </p:txBody>
       </p:sp>
@@ -11441,13 +11413,8 @@
             </a:r>
             <a:r>
               <a:rPr lang="en-GB" sz="2400"/>
-              <a:t>ng vào nhóm </a:t>
-            </a:r>
-            <a:r>
-              <a:rPr lang="en-GB" sz="2400"/>
-              <a:t>quyền</a:t>
-            </a:r>
-            <a:endParaRPr lang="en-GB" sz="2400"/>
+              <a:t>ng vào nhóm quyền</a:t>
+            </a:r>
           </a:p>
         </p:txBody>
       </p:sp>
@@ -11549,13 +11516,8 @@
           <a:p>
             <a:r>
               <a:rPr lang="en-GB"/>
-              <a:t>Nhóm </a:t>
-            </a:r>
-            <a:r>
-              <a:rPr lang="en-GB"/>
-              <a:t>quyền</a:t>
-            </a:r>
-            <a:endParaRPr lang="en-GB"/>
+              <a:t>Nhóm quyền</a:t>
+            </a:r>
           </a:p>
         </p:txBody>
       </p:sp>
@@ -12111,11 +12073,7 @@
           <a:p>
             <a:r>
               <a:rPr lang="en-GB"/>
-              <a:t>Chọn </a:t>
-            </a:r>
-            <a:r>
-              <a:rPr lang="en-GB"/>
-              <a:t>tất cả</a:t>
+              <a:t>Chọn tất cả</a:t>
             </a:r>
           </a:p>
         </p:txBody>
@@ -12182,21 +12140,8 @@
             </a:r>
             <a:r>
               <a:rPr lang="en-GB" sz="2400"/>
-              <a:t>ng </a:t>
-            </a:r>
-            <a:r>
-              <a:rPr lang="en-GB" sz="2400"/>
-              <a:t>khỏi </a:t>
-            </a:r>
-            <a:r>
-              <a:rPr lang="en-GB" sz="2400"/>
-              <a:t>nhóm </a:t>
-            </a:r>
-            <a:r>
-              <a:rPr lang="en-GB" sz="2400"/>
-              <a:t>quyền</a:t>
-            </a:r>
-            <a:endParaRPr lang="en-GB" sz="2400"/>
+              <a:t>ng khỏi nhóm quyền</a:t>
+            </a:r>
           </a:p>
         </p:txBody>
       </p:sp>
@@ -12298,13 +12243,8 @@
           <a:p>
             <a:r>
               <a:rPr lang="en-GB"/>
-              <a:t>Nhóm </a:t>
-            </a:r>
-            <a:r>
-              <a:rPr lang="en-GB"/>
-              <a:t>quyền</a:t>
-            </a:r>
-            <a:endParaRPr lang="en-GB"/>
+              <a:t>Nhóm quyền</a:t>
+            </a:r>
           </a:p>
         </p:txBody>
       </p:sp>
@@ -12860,11 +12800,7 @@
           <a:p>
             <a:r>
               <a:rPr lang="en-GB"/>
-              <a:t>Chọn </a:t>
-            </a:r>
-            <a:r>
-              <a:rPr lang="en-GB"/>
-              <a:t>tất cả</a:t>
+              <a:t>Chọn tất cả</a:t>
             </a:r>
           </a:p>
         </p:txBody>
@@ -12931,11 +12867,7 @@
             </a:r>
             <a:r>
               <a:rPr lang="en-GB" sz="2400"/>
-              <a:t> </a:t>
-            </a:r>
-            <a:r>
-              <a:rPr lang="en-GB" sz="2400"/>
-              <a:t>dùng </a:t>
+              <a:t> dùng </a:t>
             </a:r>
             <a:r>
               <a:rPr lang="en-GB" sz="2400" smtClean="0"/>
@@ -12943,13 +12875,8 @@
             </a:r>
             <a:r>
               <a:rPr lang="en-GB" sz="2400"/>
-              <a:t>nhóm </a:t>
-            </a:r>
-            <a:r>
-              <a:rPr lang="en-GB" sz="2400"/>
-              <a:t>quyền</a:t>
-            </a:r>
-            <a:endParaRPr lang="en-GB" sz="2400"/>
+              <a:t>nhóm quyền</a:t>
+            </a:r>
           </a:p>
         </p:txBody>
       </p:sp>
@@ -13051,13 +12978,8 @@
           <a:p>
             <a:r>
               <a:rPr lang="en-GB"/>
-              <a:t>Nhóm </a:t>
-            </a:r>
-            <a:r>
-              <a:rPr lang="en-GB"/>
-              <a:t>quyền</a:t>
-            </a:r>
-            <a:endParaRPr lang="en-GB"/>
+              <a:t>Nhóm quyền</a:t>
+            </a:r>
           </a:p>
         </p:txBody>
       </p:sp>
@@ -13206,15 +13128,7 @@
           <a:p>
             <a:r>
               <a:rPr lang="en-GB"/>
-              <a:t>Đỗ </a:t>
-            </a:r>
-            <a:r>
-              <a:rPr lang="en-GB"/>
-              <a:t>Phan </a:t>
-            </a:r>
-            <a:r>
-              <a:rPr lang="en-GB"/>
-              <a:t>Thuận</a:t>
+              <a:t>Đỗ Phan Thuận</a:t>
             </a:r>
           </a:p>
         </p:txBody>
@@ -13369,11 +13283,7 @@
           <a:p>
             <a:r>
               <a:rPr lang="en-GB"/>
-              <a:t>Nguyễn </a:t>
-            </a:r>
-            <a:r>
-              <a:rPr lang="en-GB"/>
-              <a:t>Tuấn Dũng</a:t>
+              <a:t>Nguyễn Tuấn Dũng</a:t>
             </a:r>
           </a:p>
         </p:txBody>
@@ -13550,11 +13460,7 @@
           <a:p>
             <a:r>
               <a:rPr lang="en-GB"/>
-              <a:t>Chọn </a:t>
-            </a:r>
-            <a:r>
-              <a:rPr lang="en-GB"/>
-              <a:t>tất cả</a:t>
+              <a:t>Chọn tất cả</a:t>
             </a:r>
           </a:p>
         </p:txBody>
@@ -14253,25 +14159,8 @@
             </a:r>
             <a:r>
               <a:rPr lang="en-GB" sz="2400"/>
-              <a:t> </a:t>
-            </a:r>
-            <a:r>
-              <a:rPr lang="en-GB" sz="2400"/>
-              <a:t>dùng </a:t>
-            </a:r>
-            <a:r>
-              <a:rPr lang="en-GB" sz="2400"/>
-              <a:t>khỏi </a:t>
-            </a:r>
-            <a:r>
-              <a:rPr lang="en-GB" sz="2400"/>
-              <a:t>nhóm </a:t>
-            </a:r>
-            <a:r>
-              <a:rPr lang="en-GB" sz="2400"/>
-              <a:t>quyền</a:t>
-            </a:r>
-            <a:endParaRPr lang="en-GB" sz="2400"/>
+              <a:t> dùng khỏi nhóm quyền</a:t>
+            </a:r>
           </a:p>
         </p:txBody>
       </p:sp>
@@ -14373,13 +14262,8 @@
           <a:p>
             <a:r>
               <a:rPr lang="en-GB"/>
-              <a:t>Nhóm </a:t>
-            </a:r>
-            <a:r>
-              <a:rPr lang="en-GB"/>
-              <a:t>quyền</a:t>
-            </a:r>
-            <a:endParaRPr lang="en-GB"/>
+              <a:t>Nhóm quyền</a:t>
+            </a:r>
           </a:p>
         </p:txBody>
       </p:sp>
@@ -14528,15 +14412,7 @@
           <a:p>
             <a:r>
               <a:rPr lang="en-GB"/>
-              <a:t>Đỗ </a:t>
-            </a:r>
-            <a:r>
-              <a:rPr lang="en-GB"/>
-              <a:t>Phan </a:t>
-            </a:r>
-            <a:r>
-              <a:rPr lang="en-GB"/>
-              <a:t>Thuận</a:t>
+              <a:t>Đỗ Phan Thuận</a:t>
             </a:r>
           </a:p>
         </p:txBody>
@@ -14691,11 +14567,7 @@
           <a:p>
             <a:r>
               <a:rPr lang="en-GB"/>
-              <a:t>Nguyễn </a:t>
-            </a:r>
-            <a:r>
-              <a:rPr lang="en-GB"/>
-              <a:t>Tuấn Dũng</a:t>
+              <a:t>Nguyễn Tuấn Dũng</a:t>
             </a:r>
           </a:p>
         </p:txBody>
@@ -14872,11 +14744,7 @@
           <a:p>
             <a:r>
               <a:rPr lang="en-GB"/>
-              <a:t>Chọn </a:t>
-            </a:r>
-            <a:r>
-              <a:rPr lang="en-GB"/>
-              <a:t>tất cả</a:t>
+              <a:t>Chọn tất cả</a:t>
             </a:r>
           </a:p>
         </p:txBody>
@@ -14895,6 +14763,2791 @@
 </file>
 
 <file path=ppt/slides/slide21.xml><?xml version="1.0" encoding="utf-8"?>
+<p:sld xmlns:a="http://schemas.openxmlformats.org/drawingml/2006/main" xmlns:r="http://schemas.openxmlformats.org/officeDocument/2006/relationships" xmlns:p="http://schemas.openxmlformats.org/presentationml/2006/main">
+  <p:cSld>
+    <p:spTree>
+      <p:nvGrpSpPr>
+        <p:cNvPr id="1" name=""/>
+        <p:cNvGrpSpPr/>
+        <p:nvPr/>
+      </p:nvGrpSpPr>
+      <p:grpSpPr>
+        <a:xfrm>
+          <a:off x="0" y="0"/>
+          <a:ext cx="0" cy="0"/>
+          <a:chOff x="0" y="0"/>
+          <a:chExt cx="0" cy="0"/>
+        </a:xfrm>
+      </p:grpSpPr>
+      <p:sp>
+        <p:nvSpPr>
+          <p:cNvPr id="2" name="TextBox 1"/>
+          <p:cNvSpPr txBox="1"/>
+          <p:nvPr/>
+        </p:nvSpPr>
+        <p:spPr>
+          <a:xfrm>
+            <a:off x="611559" y="251356"/>
+            <a:ext cx="8264687" cy="461665"/>
+          </a:xfrm>
+          <a:prstGeom prst="rect">
+            <a:avLst/>
+          </a:prstGeom>
+          <a:noFill/>
+        </p:spPr>
+        <p:txBody>
+          <a:bodyPr wrap="square" rtlCol="0">
+            <a:spAutoFit/>
+          </a:bodyPr>
+          <a:lstStyle/>
+          <a:p>
+            <a:r>
+              <a:rPr lang="en-GB" sz="2400"/>
+              <a:t>Danh sách lĩnh vực nghiên cứu của giảng </a:t>
+            </a:r>
+            <a:r>
+              <a:rPr lang="en-GB" sz="2400" smtClean="0"/>
+              <a:t>viên</a:t>
+            </a:r>
+            <a:endParaRPr lang="en-GB" sz="2400"/>
+          </a:p>
+        </p:txBody>
+      </p:sp>
+      <p:cxnSp>
+        <p:nvCxnSpPr>
+          <p:cNvPr id="3" name="Straight Connector 2"/>
+          <p:cNvCxnSpPr/>
+          <p:nvPr/>
+        </p:nvCxnSpPr>
+        <p:spPr>
+          <a:xfrm>
+            <a:off x="611560" y="764704"/>
+            <a:ext cx="8264687" cy="0"/>
+          </a:xfrm>
+          <a:prstGeom prst="line">
+            <a:avLst/>
+          </a:prstGeom>
+        </p:spPr>
+        <p:style>
+          <a:lnRef idx="1">
+            <a:schemeClr val="accent1"/>
+          </a:lnRef>
+          <a:fillRef idx="0">
+            <a:schemeClr val="accent1"/>
+          </a:fillRef>
+          <a:effectRef idx="0">
+            <a:schemeClr val="accent1"/>
+          </a:effectRef>
+          <a:fontRef idx="minor">
+            <a:schemeClr val="tx1"/>
+          </a:fontRef>
+        </p:style>
+      </p:cxnSp>
+      <p:graphicFrame>
+        <p:nvGraphicFramePr>
+          <p:cNvPr id="20" name="Table 19"/>
+          <p:cNvGraphicFramePr>
+            <a:graphicFrameLocks noGrp="1"/>
+          </p:cNvGraphicFramePr>
+          <p:nvPr>
+            <p:extLst>
+              <p:ext uri="{D42A27DB-BD31-4B8C-83A1-F6EECF244321}">
+                <p14:modId xmlns:p14="http://schemas.microsoft.com/office/powerpoint/2010/main" val="822425649"/>
+              </p:ext>
+            </p:extLst>
+          </p:nvPr>
+        </p:nvGraphicFramePr>
+        <p:xfrm>
+          <a:off x="1648864" y="2052280"/>
+          <a:ext cx="5371408" cy="1381760"/>
+        </p:xfrm>
+        <a:graphic>
+          <a:graphicData uri="http://schemas.openxmlformats.org/drawingml/2006/table">
+            <a:tbl>
+              <a:tblPr firstRow="1" bandRow="1">
+                <a:tableStyleId>{5C22544A-7EE6-4342-B048-85BDC9FD1C3A}</a:tableStyleId>
+              </a:tblPr>
+              <a:tblGrid>
+                <a:gridCol w="467081"/>
+                <a:gridCol w="1634776"/>
+                <a:gridCol w="1428483"/>
+                <a:gridCol w="1841068"/>
+              </a:tblGrid>
+              <a:tr h="370840">
+                <a:tc>
+                  <a:txBody>
+                    <a:bodyPr/>
+                    <a:lstStyle/>
+                    <a:p>
+                      <a:r>
+                        <a:rPr lang="en-GB" smtClean="0">
+                          <a:solidFill>
+                            <a:schemeClr val="tx1"/>
+                          </a:solidFill>
+                        </a:rPr>
+                        <a:t>STT</a:t>
+                      </a:r>
+                      <a:endParaRPr lang="en-GB">
+                        <a:solidFill>
+                          <a:schemeClr val="tx1"/>
+                        </a:solidFill>
+                      </a:endParaRPr>
+                    </a:p>
+                  </a:txBody>
+                  <a:tcPr>
+                    <a:lnL w="12700" cap="flat" cmpd="sng" algn="ctr">
+                      <a:solidFill>
+                        <a:schemeClr val="tx1"/>
+                      </a:solidFill>
+                      <a:prstDash val="solid"/>
+                      <a:round/>
+                      <a:headEnd type="none" w="med" len="med"/>
+                      <a:tailEnd type="none" w="med" len="med"/>
+                    </a:lnL>
+                    <a:lnR w="12700" cap="flat" cmpd="sng" algn="ctr">
+                      <a:solidFill>
+                        <a:schemeClr val="tx1"/>
+                      </a:solidFill>
+                      <a:prstDash val="solid"/>
+                      <a:round/>
+                      <a:headEnd type="none" w="med" len="med"/>
+                      <a:tailEnd type="none" w="med" len="med"/>
+                    </a:lnR>
+                    <a:lnT w="12700" cap="flat" cmpd="sng" algn="ctr">
+                      <a:solidFill>
+                        <a:schemeClr val="tx1"/>
+                      </a:solidFill>
+                      <a:prstDash val="solid"/>
+                      <a:round/>
+                      <a:headEnd type="none" w="med" len="med"/>
+                      <a:tailEnd type="none" w="med" len="med"/>
+                    </a:lnT>
+                    <a:lnB w="12700" cap="flat" cmpd="sng" algn="ctr">
+                      <a:solidFill>
+                        <a:schemeClr val="tx1"/>
+                      </a:solidFill>
+                      <a:prstDash val="solid"/>
+                      <a:round/>
+                      <a:headEnd type="none" w="med" len="med"/>
+                      <a:tailEnd type="none" w="med" len="med"/>
+                    </a:lnB>
+                    <a:noFill/>
+                  </a:tcPr>
+                </a:tc>
+                <a:tc>
+                  <a:txBody>
+                    <a:bodyPr/>
+                    <a:lstStyle/>
+                    <a:p>
+                      <a:r>
+                        <a:rPr lang="en-GB" smtClean="0">
+                          <a:solidFill>
+                            <a:schemeClr val="tx1"/>
+                          </a:solidFill>
+                        </a:rPr>
+                        <a:t>Lĩnh vực nghiên cứu</a:t>
+                      </a:r>
+                      <a:endParaRPr lang="en-GB">
+                        <a:solidFill>
+                          <a:schemeClr val="tx1"/>
+                        </a:solidFill>
+                      </a:endParaRPr>
+                    </a:p>
+                  </a:txBody>
+                  <a:tcPr>
+                    <a:lnL w="12700" cap="flat" cmpd="sng" algn="ctr">
+                      <a:solidFill>
+                        <a:schemeClr val="tx1"/>
+                      </a:solidFill>
+                      <a:prstDash val="solid"/>
+                      <a:round/>
+                      <a:headEnd type="none" w="med" len="med"/>
+                      <a:tailEnd type="none" w="med" len="med"/>
+                    </a:lnL>
+                    <a:lnR w="12700" cap="flat" cmpd="sng" algn="ctr">
+                      <a:solidFill>
+                        <a:schemeClr val="tx1"/>
+                      </a:solidFill>
+                      <a:prstDash val="solid"/>
+                      <a:round/>
+                      <a:headEnd type="none" w="med" len="med"/>
+                      <a:tailEnd type="none" w="med" len="med"/>
+                    </a:lnR>
+                    <a:lnT w="12700" cap="flat" cmpd="sng" algn="ctr">
+                      <a:solidFill>
+                        <a:schemeClr val="tx1"/>
+                      </a:solidFill>
+                      <a:prstDash val="solid"/>
+                      <a:round/>
+                      <a:headEnd type="none" w="med" len="med"/>
+                      <a:tailEnd type="none" w="med" len="med"/>
+                    </a:lnT>
+                    <a:lnB w="12700" cap="flat" cmpd="sng" algn="ctr">
+                      <a:solidFill>
+                        <a:schemeClr val="tx1"/>
+                      </a:solidFill>
+                      <a:prstDash val="solid"/>
+                      <a:round/>
+                      <a:headEnd type="none" w="med" len="med"/>
+                      <a:tailEnd type="none" w="med" len="med"/>
+                    </a:lnB>
+                    <a:noFill/>
+                  </a:tcPr>
+                </a:tc>
+                <a:tc>
+                  <a:txBody>
+                    <a:bodyPr/>
+                    <a:lstStyle/>
+                    <a:p>
+                      <a:r>
+                        <a:rPr lang="en-GB" smtClean="0">
+                          <a:solidFill>
+                            <a:schemeClr val="tx1"/>
+                          </a:solidFill>
+                        </a:rPr>
+                        <a:t>Từ ngày</a:t>
+                      </a:r>
+                      <a:endParaRPr lang="en-GB">
+                        <a:solidFill>
+                          <a:schemeClr val="tx1"/>
+                        </a:solidFill>
+                      </a:endParaRPr>
+                    </a:p>
+                  </a:txBody>
+                  <a:tcPr>
+                    <a:lnL w="12700" cap="flat" cmpd="sng" algn="ctr">
+                      <a:solidFill>
+                        <a:schemeClr val="tx1"/>
+                      </a:solidFill>
+                      <a:prstDash val="solid"/>
+                      <a:round/>
+                      <a:headEnd type="none" w="med" len="med"/>
+                      <a:tailEnd type="none" w="med" len="med"/>
+                    </a:lnL>
+                    <a:lnR w="12700" cap="flat" cmpd="sng" algn="ctr">
+                      <a:solidFill>
+                        <a:schemeClr val="tx1"/>
+                      </a:solidFill>
+                      <a:prstDash val="solid"/>
+                      <a:round/>
+                      <a:headEnd type="none" w="med" len="med"/>
+                      <a:tailEnd type="none" w="med" len="med"/>
+                    </a:lnR>
+                    <a:lnT w="12700" cap="flat" cmpd="sng" algn="ctr">
+                      <a:solidFill>
+                        <a:schemeClr val="tx1"/>
+                      </a:solidFill>
+                      <a:prstDash val="solid"/>
+                      <a:round/>
+                      <a:headEnd type="none" w="med" len="med"/>
+                      <a:tailEnd type="none" w="med" len="med"/>
+                    </a:lnT>
+                    <a:lnB w="12700" cap="flat" cmpd="sng" algn="ctr">
+                      <a:solidFill>
+                        <a:schemeClr val="tx1"/>
+                      </a:solidFill>
+                      <a:prstDash val="solid"/>
+                      <a:round/>
+                      <a:headEnd type="none" w="med" len="med"/>
+                      <a:tailEnd type="none" w="med" len="med"/>
+                    </a:lnB>
+                    <a:noFill/>
+                  </a:tcPr>
+                </a:tc>
+                <a:tc>
+                  <a:txBody>
+                    <a:bodyPr/>
+                    <a:lstStyle/>
+                    <a:p>
+                      <a:r>
+                        <a:rPr lang="en-GB" smtClean="0">
+                          <a:solidFill>
+                            <a:schemeClr val="tx1"/>
+                          </a:solidFill>
+                        </a:rPr>
+                        <a:t>Đến ngày</a:t>
+                      </a:r>
+                      <a:endParaRPr lang="en-GB">
+                        <a:solidFill>
+                          <a:schemeClr val="tx1"/>
+                        </a:solidFill>
+                      </a:endParaRPr>
+                    </a:p>
+                  </a:txBody>
+                  <a:tcPr>
+                    <a:lnL w="12700" cap="flat" cmpd="sng" algn="ctr">
+                      <a:solidFill>
+                        <a:schemeClr val="tx1"/>
+                      </a:solidFill>
+                      <a:prstDash val="solid"/>
+                      <a:round/>
+                      <a:headEnd type="none" w="med" len="med"/>
+                      <a:tailEnd type="none" w="med" len="med"/>
+                    </a:lnL>
+                    <a:lnR w="12700" cap="flat" cmpd="sng" algn="ctr">
+                      <a:solidFill>
+                        <a:schemeClr val="tx1"/>
+                      </a:solidFill>
+                      <a:prstDash val="solid"/>
+                      <a:round/>
+                      <a:headEnd type="none" w="med" len="med"/>
+                      <a:tailEnd type="none" w="med" len="med"/>
+                    </a:lnR>
+                    <a:lnT w="12700" cap="flat" cmpd="sng" algn="ctr">
+                      <a:solidFill>
+                        <a:schemeClr val="tx1"/>
+                      </a:solidFill>
+                      <a:prstDash val="solid"/>
+                      <a:round/>
+                      <a:headEnd type="none" w="med" len="med"/>
+                      <a:tailEnd type="none" w="med" len="med"/>
+                    </a:lnT>
+                    <a:lnB w="12700" cap="flat" cmpd="sng" algn="ctr">
+                      <a:solidFill>
+                        <a:schemeClr val="tx1"/>
+                      </a:solidFill>
+                      <a:prstDash val="solid"/>
+                      <a:round/>
+                      <a:headEnd type="none" w="med" len="med"/>
+                      <a:tailEnd type="none" w="med" len="med"/>
+                    </a:lnB>
+                    <a:noFill/>
+                  </a:tcPr>
+                </a:tc>
+              </a:tr>
+              <a:tr h="370840">
+                <a:tc>
+                  <a:txBody>
+                    <a:bodyPr/>
+                    <a:lstStyle/>
+                    <a:p>
+                      <a:r>
+                        <a:rPr lang="en-GB" smtClean="0">
+                          <a:solidFill>
+                            <a:schemeClr val="tx1"/>
+                          </a:solidFill>
+                        </a:rPr>
+                        <a:t>1</a:t>
+                      </a:r>
+                      <a:endParaRPr lang="en-GB">
+                        <a:solidFill>
+                          <a:schemeClr val="tx1"/>
+                        </a:solidFill>
+                      </a:endParaRPr>
+                    </a:p>
+                  </a:txBody>
+                  <a:tcPr>
+                    <a:lnL w="12700" cap="flat" cmpd="sng" algn="ctr">
+                      <a:solidFill>
+                        <a:schemeClr val="tx1"/>
+                      </a:solidFill>
+                      <a:prstDash val="solid"/>
+                      <a:round/>
+                      <a:headEnd type="none" w="med" len="med"/>
+                      <a:tailEnd type="none" w="med" len="med"/>
+                    </a:lnL>
+                    <a:lnR w="12700" cap="flat" cmpd="sng" algn="ctr">
+                      <a:solidFill>
+                        <a:schemeClr val="tx1"/>
+                      </a:solidFill>
+                      <a:prstDash val="solid"/>
+                      <a:round/>
+                      <a:headEnd type="none" w="med" len="med"/>
+                      <a:tailEnd type="none" w="med" len="med"/>
+                    </a:lnR>
+                    <a:lnT w="12700" cap="flat" cmpd="sng" algn="ctr">
+                      <a:solidFill>
+                        <a:schemeClr val="tx1"/>
+                      </a:solidFill>
+                      <a:prstDash val="solid"/>
+                      <a:round/>
+                      <a:headEnd type="none" w="med" len="med"/>
+                      <a:tailEnd type="none" w="med" len="med"/>
+                    </a:lnT>
+                    <a:lnB w="12700" cap="flat" cmpd="sng" algn="ctr">
+                      <a:solidFill>
+                        <a:schemeClr val="tx1"/>
+                      </a:solidFill>
+                      <a:prstDash val="solid"/>
+                      <a:round/>
+                      <a:headEnd type="none" w="med" len="med"/>
+                      <a:tailEnd type="none" w="med" len="med"/>
+                    </a:lnB>
+                    <a:noFill/>
+                  </a:tcPr>
+                </a:tc>
+                <a:tc>
+                  <a:txBody>
+                    <a:bodyPr/>
+                    <a:lstStyle/>
+                    <a:p>
+                      <a:endParaRPr lang="en-GB">
+                        <a:solidFill>
+                          <a:schemeClr val="tx1"/>
+                        </a:solidFill>
+                      </a:endParaRPr>
+                    </a:p>
+                  </a:txBody>
+                  <a:tcPr>
+                    <a:lnL w="12700" cap="flat" cmpd="sng" algn="ctr">
+                      <a:solidFill>
+                        <a:schemeClr val="tx1"/>
+                      </a:solidFill>
+                      <a:prstDash val="solid"/>
+                      <a:round/>
+                      <a:headEnd type="none" w="med" len="med"/>
+                      <a:tailEnd type="none" w="med" len="med"/>
+                    </a:lnL>
+                    <a:lnR w="12700" cap="flat" cmpd="sng" algn="ctr">
+                      <a:solidFill>
+                        <a:schemeClr val="tx1"/>
+                      </a:solidFill>
+                      <a:prstDash val="solid"/>
+                      <a:round/>
+                      <a:headEnd type="none" w="med" len="med"/>
+                      <a:tailEnd type="none" w="med" len="med"/>
+                    </a:lnR>
+                    <a:lnT w="12700" cap="flat" cmpd="sng" algn="ctr">
+                      <a:solidFill>
+                        <a:schemeClr val="tx1"/>
+                      </a:solidFill>
+                      <a:prstDash val="solid"/>
+                      <a:round/>
+                      <a:headEnd type="none" w="med" len="med"/>
+                      <a:tailEnd type="none" w="med" len="med"/>
+                    </a:lnT>
+                    <a:lnB w="12700" cap="flat" cmpd="sng" algn="ctr">
+                      <a:solidFill>
+                        <a:schemeClr val="tx1"/>
+                      </a:solidFill>
+                      <a:prstDash val="solid"/>
+                      <a:round/>
+                      <a:headEnd type="none" w="med" len="med"/>
+                      <a:tailEnd type="none" w="med" len="med"/>
+                    </a:lnB>
+                    <a:noFill/>
+                  </a:tcPr>
+                </a:tc>
+                <a:tc>
+                  <a:txBody>
+                    <a:bodyPr/>
+                    <a:lstStyle/>
+                    <a:p>
+                      <a:endParaRPr lang="en-GB">
+                        <a:solidFill>
+                          <a:schemeClr val="tx1"/>
+                        </a:solidFill>
+                      </a:endParaRPr>
+                    </a:p>
+                  </a:txBody>
+                  <a:tcPr>
+                    <a:lnL w="12700" cap="flat" cmpd="sng" algn="ctr">
+                      <a:solidFill>
+                        <a:schemeClr val="tx1"/>
+                      </a:solidFill>
+                      <a:prstDash val="solid"/>
+                      <a:round/>
+                      <a:headEnd type="none" w="med" len="med"/>
+                      <a:tailEnd type="none" w="med" len="med"/>
+                    </a:lnL>
+                    <a:lnR w="12700" cap="flat" cmpd="sng" algn="ctr">
+                      <a:solidFill>
+                        <a:schemeClr val="tx1"/>
+                      </a:solidFill>
+                      <a:prstDash val="solid"/>
+                      <a:round/>
+                      <a:headEnd type="none" w="med" len="med"/>
+                      <a:tailEnd type="none" w="med" len="med"/>
+                    </a:lnR>
+                    <a:lnT w="12700" cap="flat" cmpd="sng" algn="ctr">
+                      <a:solidFill>
+                        <a:schemeClr val="tx1"/>
+                      </a:solidFill>
+                      <a:prstDash val="solid"/>
+                      <a:round/>
+                      <a:headEnd type="none" w="med" len="med"/>
+                      <a:tailEnd type="none" w="med" len="med"/>
+                    </a:lnT>
+                    <a:lnB w="12700" cap="flat" cmpd="sng" algn="ctr">
+                      <a:solidFill>
+                        <a:schemeClr val="tx1"/>
+                      </a:solidFill>
+                      <a:prstDash val="solid"/>
+                      <a:round/>
+                      <a:headEnd type="none" w="med" len="med"/>
+                      <a:tailEnd type="none" w="med" len="med"/>
+                    </a:lnB>
+                    <a:noFill/>
+                  </a:tcPr>
+                </a:tc>
+                <a:tc>
+                  <a:txBody>
+                    <a:bodyPr/>
+                    <a:lstStyle/>
+                    <a:p>
+                      <a:endParaRPr lang="en-GB">
+                        <a:solidFill>
+                          <a:schemeClr val="tx1"/>
+                        </a:solidFill>
+                      </a:endParaRPr>
+                    </a:p>
+                  </a:txBody>
+                  <a:tcPr>
+                    <a:lnL w="12700" cap="flat" cmpd="sng" algn="ctr">
+                      <a:solidFill>
+                        <a:schemeClr val="tx1"/>
+                      </a:solidFill>
+                      <a:prstDash val="solid"/>
+                      <a:round/>
+                      <a:headEnd type="none" w="med" len="med"/>
+                      <a:tailEnd type="none" w="med" len="med"/>
+                    </a:lnL>
+                    <a:lnR w="12700" cap="flat" cmpd="sng" algn="ctr">
+                      <a:solidFill>
+                        <a:schemeClr val="tx1"/>
+                      </a:solidFill>
+                      <a:prstDash val="solid"/>
+                      <a:round/>
+                      <a:headEnd type="none" w="med" len="med"/>
+                      <a:tailEnd type="none" w="med" len="med"/>
+                    </a:lnR>
+                    <a:lnT w="12700" cap="flat" cmpd="sng" algn="ctr">
+                      <a:solidFill>
+                        <a:schemeClr val="tx1"/>
+                      </a:solidFill>
+                      <a:prstDash val="solid"/>
+                      <a:round/>
+                      <a:headEnd type="none" w="med" len="med"/>
+                      <a:tailEnd type="none" w="med" len="med"/>
+                    </a:lnT>
+                    <a:lnB w="12700" cap="flat" cmpd="sng" algn="ctr">
+                      <a:solidFill>
+                        <a:schemeClr val="tx1"/>
+                      </a:solidFill>
+                      <a:prstDash val="solid"/>
+                      <a:round/>
+                      <a:headEnd type="none" w="med" len="med"/>
+                      <a:tailEnd type="none" w="med" len="med"/>
+                    </a:lnB>
+                    <a:noFill/>
+                  </a:tcPr>
+                </a:tc>
+              </a:tr>
+              <a:tr h="370840">
+                <a:tc>
+                  <a:txBody>
+                    <a:bodyPr/>
+                    <a:lstStyle/>
+                    <a:p>
+                      <a:r>
+                        <a:rPr lang="en-GB" smtClean="0">
+                          <a:solidFill>
+                            <a:schemeClr val="tx1"/>
+                          </a:solidFill>
+                        </a:rPr>
+                        <a:t>2</a:t>
+                      </a:r>
+                      <a:endParaRPr lang="en-GB">
+                        <a:solidFill>
+                          <a:schemeClr val="tx1"/>
+                        </a:solidFill>
+                      </a:endParaRPr>
+                    </a:p>
+                  </a:txBody>
+                  <a:tcPr>
+                    <a:lnL w="12700" cap="flat" cmpd="sng" algn="ctr">
+                      <a:solidFill>
+                        <a:schemeClr val="tx1"/>
+                      </a:solidFill>
+                      <a:prstDash val="solid"/>
+                      <a:round/>
+                      <a:headEnd type="none" w="med" len="med"/>
+                      <a:tailEnd type="none" w="med" len="med"/>
+                    </a:lnL>
+                    <a:lnR w="12700" cap="flat" cmpd="sng" algn="ctr">
+                      <a:solidFill>
+                        <a:schemeClr val="tx1"/>
+                      </a:solidFill>
+                      <a:prstDash val="solid"/>
+                      <a:round/>
+                      <a:headEnd type="none" w="med" len="med"/>
+                      <a:tailEnd type="none" w="med" len="med"/>
+                    </a:lnR>
+                    <a:lnT w="12700" cap="flat" cmpd="sng" algn="ctr">
+                      <a:solidFill>
+                        <a:schemeClr val="tx1"/>
+                      </a:solidFill>
+                      <a:prstDash val="solid"/>
+                      <a:round/>
+                      <a:headEnd type="none" w="med" len="med"/>
+                      <a:tailEnd type="none" w="med" len="med"/>
+                    </a:lnT>
+                    <a:lnB w="12700" cap="flat" cmpd="sng" algn="ctr">
+                      <a:solidFill>
+                        <a:schemeClr val="tx1"/>
+                      </a:solidFill>
+                      <a:prstDash val="solid"/>
+                      <a:round/>
+                      <a:headEnd type="none" w="med" len="med"/>
+                      <a:tailEnd type="none" w="med" len="med"/>
+                    </a:lnB>
+                    <a:noFill/>
+                  </a:tcPr>
+                </a:tc>
+                <a:tc>
+                  <a:txBody>
+                    <a:bodyPr/>
+                    <a:lstStyle/>
+                    <a:p>
+                      <a:endParaRPr lang="en-GB">
+                        <a:solidFill>
+                          <a:schemeClr val="tx1"/>
+                        </a:solidFill>
+                      </a:endParaRPr>
+                    </a:p>
+                  </a:txBody>
+                  <a:tcPr>
+                    <a:lnL w="12700" cap="flat" cmpd="sng" algn="ctr">
+                      <a:solidFill>
+                        <a:schemeClr val="tx1"/>
+                      </a:solidFill>
+                      <a:prstDash val="solid"/>
+                      <a:round/>
+                      <a:headEnd type="none" w="med" len="med"/>
+                      <a:tailEnd type="none" w="med" len="med"/>
+                    </a:lnL>
+                    <a:lnR w="12700" cap="flat" cmpd="sng" algn="ctr">
+                      <a:solidFill>
+                        <a:schemeClr val="tx1"/>
+                      </a:solidFill>
+                      <a:prstDash val="solid"/>
+                      <a:round/>
+                      <a:headEnd type="none" w="med" len="med"/>
+                      <a:tailEnd type="none" w="med" len="med"/>
+                    </a:lnR>
+                    <a:lnT w="12700" cap="flat" cmpd="sng" algn="ctr">
+                      <a:solidFill>
+                        <a:schemeClr val="tx1"/>
+                      </a:solidFill>
+                      <a:prstDash val="solid"/>
+                      <a:round/>
+                      <a:headEnd type="none" w="med" len="med"/>
+                      <a:tailEnd type="none" w="med" len="med"/>
+                    </a:lnT>
+                    <a:lnB w="12700" cap="flat" cmpd="sng" algn="ctr">
+                      <a:solidFill>
+                        <a:schemeClr val="tx1"/>
+                      </a:solidFill>
+                      <a:prstDash val="solid"/>
+                      <a:round/>
+                      <a:headEnd type="none" w="med" len="med"/>
+                      <a:tailEnd type="none" w="med" len="med"/>
+                    </a:lnB>
+                    <a:noFill/>
+                  </a:tcPr>
+                </a:tc>
+                <a:tc>
+                  <a:txBody>
+                    <a:bodyPr/>
+                    <a:lstStyle/>
+                    <a:p>
+                      <a:endParaRPr lang="en-GB">
+                        <a:solidFill>
+                          <a:schemeClr val="tx1"/>
+                        </a:solidFill>
+                      </a:endParaRPr>
+                    </a:p>
+                  </a:txBody>
+                  <a:tcPr>
+                    <a:lnL w="12700" cap="flat" cmpd="sng" algn="ctr">
+                      <a:solidFill>
+                        <a:schemeClr val="tx1"/>
+                      </a:solidFill>
+                      <a:prstDash val="solid"/>
+                      <a:round/>
+                      <a:headEnd type="none" w="med" len="med"/>
+                      <a:tailEnd type="none" w="med" len="med"/>
+                    </a:lnL>
+                    <a:lnR w="12700" cap="flat" cmpd="sng" algn="ctr">
+                      <a:solidFill>
+                        <a:schemeClr val="tx1"/>
+                      </a:solidFill>
+                      <a:prstDash val="solid"/>
+                      <a:round/>
+                      <a:headEnd type="none" w="med" len="med"/>
+                      <a:tailEnd type="none" w="med" len="med"/>
+                    </a:lnR>
+                    <a:lnT w="12700" cap="flat" cmpd="sng" algn="ctr">
+                      <a:solidFill>
+                        <a:schemeClr val="tx1"/>
+                      </a:solidFill>
+                      <a:prstDash val="solid"/>
+                      <a:round/>
+                      <a:headEnd type="none" w="med" len="med"/>
+                      <a:tailEnd type="none" w="med" len="med"/>
+                    </a:lnT>
+                    <a:lnB w="12700" cap="flat" cmpd="sng" algn="ctr">
+                      <a:solidFill>
+                        <a:schemeClr val="tx1"/>
+                      </a:solidFill>
+                      <a:prstDash val="solid"/>
+                      <a:round/>
+                      <a:headEnd type="none" w="med" len="med"/>
+                      <a:tailEnd type="none" w="med" len="med"/>
+                    </a:lnB>
+                    <a:noFill/>
+                  </a:tcPr>
+                </a:tc>
+                <a:tc>
+                  <a:txBody>
+                    <a:bodyPr/>
+                    <a:lstStyle/>
+                    <a:p>
+                      <a:endParaRPr lang="en-GB">
+                        <a:solidFill>
+                          <a:schemeClr val="tx1"/>
+                        </a:solidFill>
+                      </a:endParaRPr>
+                    </a:p>
+                  </a:txBody>
+                  <a:tcPr>
+                    <a:lnL w="12700" cap="flat" cmpd="sng" algn="ctr">
+                      <a:solidFill>
+                        <a:schemeClr val="tx1"/>
+                      </a:solidFill>
+                      <a:prstDash val="solid"/>
+                      <a:round/>
+                      <a:headEnd type="none" w="med" len="med"/>
+                      <a:tailEnd type="none" w="med" len="med"/>
+                    </a:lnL>
+                    <a:lnR w="12700" cap="flat" cmpd="sng" algn="ctr">
+                      <a:solidFill>
+                        <a:schemeClr val="tx1"/>
+                      </a:solidFill>
+                      <a:prstDash val="solid"/>
+                      <a:round/>
+                      <a:headEnd type="none" w="med" len="med"/>
+                      <a:tailEnd type="none" w="med" len="med"/>
+                    </a:lnR>
+                    <a:lnT w="12700" cap="flat" cmpd="sng" algn="ctr">
+                      <a:solidFill>
+                        <a:schemeClr val="tx1"/>
+                      </a:solidFill>
+                      <a:prstDash val="solid"/>
+                      <a:round/>
+                      <a:headEnd type="none" w="med" len="med"/>
+                      <a:tailEnd type="none" w="med" len="med"/>
+                    </a:lnT>
+                    <a:lnB w="12700" cap="flat" cmpd="sng" algn="ctr">
+                      <a:solidFill>
+                        <a:schemeClr val="tx1"/>
+                      </a:solidFill>
+                      <a:prstDash val="solid"/>
+                      <a:round/>
+                      <a:headEnd type="none" w="med" len="med"/>
+                      <a:tailEnd type="none" w="med" len="med"/>
+                    </a:lnB>
+                    <a:noFill/>
+                  </a:tcPr>
+                </a:tc>
+              </a:tr>
+            </a:tbl>
+          </a:graphicData>
+        </a:graphic>
+      </p:graphicFrame>
+      <p:sp>
+        <p:nvSpPr>
+          <p:cNvPr id="21" name="Rounded Rectangle 20"/>
+          <p:cNvSpPr/>
+          <p:nvPr/>
+        </p:nvSpPr>
+        <p:spPr>
+          <a:xfrm>
+            <a:off x="5436096" y="1268760"/>
+            <a:ext cx="1512168" cy="576064"/>
+          </a:xfrm>
+          <a:prstGeom prst="roundRect">
+            <a:avLst/>
+          </a:prstGeom>
+        </p:spPr>
+        <p:style>
+          <a:lnRef idx="2">
+            <a:schemeClr val="accent1">
+              <a:shade val="50000"/>
+            </a:schemeClr>
+          </a:lnRef>
+          <a:fillRef idx="1">
+            <a:schemeClr val="accent1"/>
+          </a:fillRef>
+          <a:effectRef idx="0">
+            <a:schemeClr val="accent1"/>
+          </a:effectRef>
+          <a:fontRef idx="minor">
+            <a:schemeClr val="lt1"/>
+          </a:fontRef>
+        </p:style>
+        <p:txBody>
+          <a:bodyPr rtlCol="0" anchor="ctr"/>
+          <a:lstStyle/>
+          <a:p>
+            <a:pPr algn="ctr"/>
+            <a:r>
+              <a:rPr lang="en-GB" err="1" smtClean="0"/>
+              <a:t>Thêm</a:t>
+            </a:r>
+            <a:endParaRPr lang="en-GB"/>
+          </a:p>
+        </p:txBody>
+      </p:sp>
+    </p:spTree>
+    <p:extLst>
+      <p:ext uri="{BB962C8B-B14F-4D97-AF65-F5344CB8AC3E}">
+        <p14:creationId xmlns:p14="http://schemas.microsoft.com/office/powerpoint/2010/main" val="2522958785"/>
+      </p:ext>
+    </p:extLst>
+  </p:cSld>
+  <p:clrMapOvr>
+    <a:masterClrMapping/>
+  </p:clrMapOvr>
+</p:sld>
+</file>
+
+<file path=ppt/slides/slide22.xml><?xml version="1.0" encoding="utf-8"?>
+<p:sld xmlns:a="http://schemas.openxmlformats.org/drawingml/2006/main" xmlns:r="http://schemas.openxmlformats.org/officeDocument/2006/relationships" xmlns:p="http://schemas.openxmlformats.org/presentationml/2006/main">
+  <p:cSld>
+    <p:spTree>
+      <p:nvGrpSpPr>
+        <p:cNvPr id="1" name=""/>
+        <p:cNvGrpSpPr/>
+        <p:nvPr/>
+      </p:nvGrpSpPr>
+      <p:grpSpPr>
+        <a:xfrm>
+          <a:off x="0" y="0"/>
+          <a:ext cx="0" cy="0"/>
+          <a:chOff x="0" y="0"/>
+          <a:chExt cx="0" cy="0"/>
+        </a:xfrm>
+      </p:grpSpPr>
+      <p:sp>
+        <p:nvSpPr>
+          <p:cNvPr id="2" name="TextBox 1"/>
+          <p:cNvSpPr txBox="1"/>
+          <p:nvPr/>
+        </p:nvSpPr>
+        <p:spPr>
+          <a:xfrm>
+            <a:off x="611559" y="251356"/>
+            <a:ext cx="8264687" cy="461665"/>
+          </a:xfrm>
+          <a:prstGeom prst="rect">
+            <a:avLst/>
+          </a:prstGeom>
+          <a:noFill/>
+        </p:spPr>
+        <p:txBody>
+          <a:bodyPr wrap="square" rtlCol="0">
+            <a:spAutoFit/>
+          </a:bodyPr>
+          <a:lstStyle/>
+          <a:p>
+            <a:r>
+              <a:rPr lang="en-GB" sz="2400"/>
+              <a:t>Form </a:t>
+            </a:r>
+            <a:r>
+              <a:rPr lang="en-GB" sz="2400" smtClean="0"/>
+              <a:t>Thêm </a:t>
+            </a:r>
+            <a:r>
+              <a:rPr lang="en-GB" sz="2400"/>
+              <a:t>lĩnh vực nghiên cứu của giảng </a:t>
+            </a:r>
+            <a:r>
+              <a:rPr lang="en-GB" sz="2400" smtClean="0"/>
+              <a:t>viên</a:t>
+            </a:r>
+            <a:endParaRPr lang="en-GB" sz="2400"/>
+          </a:p>
+        </p:txBody>
+      </p:sp>
+      <p:cxnSp>
+        <p:nvCxnSpPr>
+          <p:cNvPr id="3" name="Straight Connector 2"/>
+          <p:cNvCxnSpPr/>
+          <p:nvPr/>
+        </p:nvCxnSpPr>
+        <p:spPr>
+          <a:xfrm>
+            <a:off x="611560" y="764704"/>
+            <a:ext cx="8264687" cy="0"/>
+          </a:xfrm>
+          <a:prstGeom prst="line">
+            <a:avLst/>
+          </a:prstGeom>
+        </p:spPr>
+        <p:style>
+          <a:lnRef idx="1">
+            <a:schemeClr val="accent1"/>
+          </a:lnRef>
+          <a:fillRef idx="0">
+            <a:schemeClr val="accent1"/>
+          </a:fillRef>
+          <a:effectRef idx="0">
+            <a:schemeClr val="accent1"/>
+          </a:effectRef>
+          <a:fontRef idx="minor">
+            <a:schemeClr val="tx1"/>
+          </a:fontRef>
+        </p:style>
+      </p:cxnSp>
+      <p:sp>
+        <p:nvSpPr>
+          <p:cNvPr id="6" name="Rectangle 5"/>
+          <p:cNvSpPr/>
+          <p:nvPr/>
+        </p:nvSpPr>
+        <p:spPr>
+          <a:xfrm>
+            <a:off x="4187343" y="1484784"/>
+            <a:ext cx="1872208" cy="359278"/>
+          </a:xfrm>
+          <a:prstGeom prst="rect">
+            <a:avLst/>
+          </a:prstGeom>
+        </p:spPr>
+        <p:style>
+          <a:lnRef idx="2">
+            <a:schemeClr val="accent1">
+              <a:shade val="50000"/>
+            </a:schemeClr>
+          </a:lnRef>
+          <a:fillRef idx="1">
+            <a:schemeClr val="accent1"/>
+          </a:fillRef>
+          <a:effectRef idx="0">
+            <a:schemeClr val="accent1"/>
+          </a:effectRef>
+          <a:fontRef idx="minor">
+            <a:schemeClr val="lt1"/>
+          </a:fontRef>
+        </p:style>
+        <p:txBody>
+          <a:bodyPr rtlCol="0" anchor="ctr"/>
+          <a:lstStyle/>
+          <a:p>
+            <a:pPr algn="ctr"/>
+            <a:r>
+              <a:rPr lang="en-GB" smtClean="0"/>
+              <a:t>select-box </a:t>
+            </a:r>
+            <a:endParaRPr lang="en-GB"/>
+          </a:p>
+        </p:txBody>
+      </p:sp>
+      <p:sp>
+        <p:nvSpPr>
+          <p:cNvPr id="4" name="TextBox 3"/>
+          <p:cNvSpPr txBox="1"/>
+          <p:nvPr/>
+        </p:nvSpPr>
+        <p:spPr>
+          <a:xfrm>
+            <a:off x="827584" y="1484784"/>
+            <a:ext cx="3024336" cy="369332"/>
+          </a:xfrm>
+          <a:prstGeom prst="rect">
+            <a:avLst/>
+          </a:prstGeom>
+          <a:noFill/>
+        </p:spPr>
+        <p:txBody>
+          <a:bodyPr wrap="square" rtlCol="0">
+            <a:spAutoFit/>
+          </a:bodyPr>
+          <a:lstStyle/>
+          <a:p>
+            <a:r>
+              <a:rPr lang="en-GB"/>
+              <a:t>Lĩnh vực </a:t>
+            </a:r>
+            <a:r>
+              <a:rPr lang="en-GB"/>
+              <a:t>nghiên cứu</a:t>
+            </a:r>
+          </a:p>
+        </p:txBody>
+      </p:sp>
+      <p:sp>
+        <p:nvSpPr>
+          <p:cNvPr id="8" name="Rectangle 7"/>
+          <p:cNvSpPr/>
+          <p:nvPr/>
+        </p:nvSpPr>
+        <p:spPr>
+          <a:xfrm>
+            <a:off x="4187343" y="2195572"/>
+            <a:ext cx="1872208" cy="359278"/>
+          </a:xfrm>
+          <a:prstGeom prst="rect">
+            <a:avLst/>
+          </a:prstGeom>
+        </p:spPr>
+        <p:style>
+          <a:lnRef idx="2">
+            <a:schemeClr val="accent1">
+              <a:shade val="50000"/>
+            </a:schemeClr>
+          </a:lnRef>
+          <a:fillRef idx="1">
+            <a:schemeClr val="accent1"/>
+          </a:fillRef>
+          <a:effectRef idx="0">
+            <a:schemeClr val="accent1"/>
+          </a:effectRef>
+          <a:fontRef idx="minor">
+            <a:schemeClr val="lt1"/>
+          </a:fontRef>
+        </p:style>
+        <p:txBody>
+          <a:bodyPr rtlCol="0" anchor="ctr"/>
+          <a:lstStyle/>
+          <a:p>
+            <a:pPr algn="ctr"/>
+            <a:r>
+              <a:rPr lang="en-GB" smtClean="0"/>
+              <a:t>date </a:t>
+            </a:r>
+            <a:endParaRPr lang="en-GB"/>
+          </a:p>
+        </p:txBody>
+      </p:sp>
+      <p:sp>
+        <p:nvSpPr>
+          <p:cNvPr id="9" name="TextBox 8"/>
+          <p:cNvSpPr txBox="1"/>
+          <p:nvPr/>
+        </p:nvSpPr>
+        <p:spPr>
+          <a:xfrm>
+            <a:off x="827584" y="2195572"/>
+            <a:ext cx="3024336" cy="369332"/>
+          </a:xfrm>
+          <a:prstGeom prst="rect">
+            <a:avLst/>
+          </a:prstGeom>
+          <a:noFill/>
+        </p:spPr>
+        <p:txBody>
+          <a:bodyPr wrap="square" rtlCol="0">
+            <a:spAutoFit/>
+          </a:bodyPr>
+          <a:lstStyle/>
+          <a:p>
+            <a:r>
+              <a:rPr lang="en-GB"/>
+              <a:t>từ </a:t>
+            </a:r>
+            <a:r>
+              <a:rPr lang="en-GB"/>
+              <a:t>ngày  </a:t>
+            </a:r>
+            <a:r>
+              <a:rPr lang="en-GB"/>
+              <a:t>(bắt </a:t>
+            </a:r>
+            <a:r>
+              <a:rPr lang="en-GB" smtClean="0"/>
+              <a:t>buộc)</a:t>
+            </a:r>
+            <a:endParaRPr lang="en-GB"/>
+          </a:p>
+        </p:txBody>
+      </p:sp>
+      <p:sp>
+        <p:nvSpPr>
+          <p:cNvPr id="10" name="Rectangle 9"/>
+          <p:cNvSpPr/>
+          <p:nvPr/>
+        </p:nvSpPr>
+        <p:spPr>
+          <a:xfrm>
+            <a:off x="4187343" y="2852936"/>
+            <a:ext cx="1872208" cy="359278"/>
+          </a:xfrm>
+          <a:prstGeom prst="rect">
+            <a:avLst/>
+          </a:prstGeom>
+        </p:spPr>
+        <p:style>
+          <a:lnRef idx="2">
+            <a:schemeClr val="accent1">
+              <a:shade val="50000"/>
+            </a:schemeClr>
+          </a:lnRef>
+          <a:fillRef idx="1">
+            <a:schemeClr val="accent1"/>
+          </a:fillRef>
+          <a:effectRef idx="0">
+            <a:schemeClr val="accent1"/>
+          </a:effectRef>
+          <a:fontRef idx="minor">
+            <a:schemeClr val="lt1"/>
+          </a:fontRef>
+        </p:style>
+        <p:txBody>
+          <a:bodyPr rtlCol="0" anchor="ctr"/>
+          <a:lstStyle/>
+          <a:p>
+            <a:pPr algn="ctr"/>
+            <a:r>
+              <a:rPr lang="en-GB" smtClean="0"/>
+              <a:t>date</a:t>
+            </a:r>
+            <a:endParaRPr lang="en-GB"/>
+          </a:p>
+        </p:txBody>
+      </p:sp>
+      <p:sp>
+        <p:nvSpPr>
+          <p:cNvPr id="11" name="TextBox 10"/>
+          <p:cNvSpPr txBox="1"/>
+          <p:nvPr/>
+        </p:nvSpPr>
+        <p:spPr>
+          <a:xfrm>
+            <a:off x="827584" y="2852936"/>
+            <a:ext cx="3024336" cy="369332"/>
+          </a:xfrm>
+          <a:prstGeom prst="rect">
+            <a:avLst/>
+          </a:prstGeom>
+          <a:noFill/>
+        </p:spPr>
+        <p:txBody>
+          <a:bodyPr wrap="square" rtlCol="0">
+            <a:spAutoFit/>
+          </a:bodyPr>
+          <a:lstStyle/>
+          <a:p>
+            <a:r>
+              <a:rPr lang="vi-VN" smtClean="0"/>
+              <a:t>Đến</a:t>
+            </a:r>
+            <a:r>
+              <a:rPr lang="en-GB"/>
+              <a:t> </a:t>
+            </a:r>
+            <a:r>
+              <a:rPr lang="en-GB" smtClean="0"/>
+              <a:t>ngày (th</a:t>
+            </a:r>
+            <a:r>
+              <a:rPr lang="vi-VN" smtClean="0"/>
+              <a:t>ường</a:t>
+            </a:r>
+            <a:r>
+              <a:rPr lang="en-GB" smtClean="0"/>
+              <a:t> </a:t>
+            </a:r>
+            <a:r>
+              <a:rPr lang="vi-VN" smtClean="0"/>
+              <a:t>để</a:t>
+            </a:r>
+            <a:r>
+              <a:rPr lang="en-GB" smtClean="0"/>
+              <a:t> null)</a:t>
+            </a:r>
+            <a:endParaRPr lang="en-GB"/>
+          </a:p>
+        </p:txBody>
+      </p:sp>
+      <p:sp>
+        <p:nvSpPr>
+          <p:cNvPr id="12" name="Rounded Rectangle 11"/>
+          <p:cNvSpPr/>
+          <p:nvPr/>
+        </p:nvSpPr>
+        <p:spPr>
+          <a:xfrm>
+            <a:off x="2726967" y="3679304"/>
+            <a:ext cx="1512168" cy="576064"/>
+          </a:xfrm>
+          <a:prstGeom prst="roundRect">
+            <a:avLst/>
+          </a:prstGeom>
+        </p:spPr>
+        <p:style>
+          <a:lnRef idx="2">
+            <a:schemeClr val="accent1">
+              <a:shade val="50000"/>
+            </a:schemeClr>
+          </a:lnRef>
+          <a:fillRef idx="1">
+            <a:schemeClr val="accent1"/>
+          </a:fillRef>
+          <a:effectRef idx="0">
+            <a:schemeClr val="accent1"/>
+          </a:effectRef>
+          <a:fontRef idx="minor">
+            <a:schemeClr val="lt1"/>
+          </a:fontRef>
+        </p:style>
+        <p:txBody>
+          <a:bodyPr rtlCol="0" anchor="ctr"/>
+          <a:lstStyle/>
+          <a:p>
+            <a:pPr algn="ctr"/>
+            <a:r>
+              <a:rPr lang="en-GB" smtClean="0"/>
+              <a:t>L</a:t>
+            </a:r>
+            <a:r>
+              <a:rPr lang="vi-VN" smtClean="0"/>
+              <a:t>ư</a:t>
+            </a:r>
+            <a:r>
+              <a:rPr lang="en-GB" smtClean="0"/>
+              <a:t>u</a:t>
+            </a:r>
+            <a:endParaRPr lang="en-GB"/>
+          </a:p>
+        </p:txBody>
+      </p:sp>
+      <p:sp>
+        <p:nvSpPr>
+          <p:cNvPr id="13" name="Rounded Rectangle 12"/>
+          <p:cNvSpPr/>
+          <p:nvPr/>
+        </p:nvSpPr>
+        <p:spPr>
+          <a:xfrm>
+            <a:off x="4526392" y="3679304"/>
+            <a:ext cx="1512168" cy="576064"/>
+          </a:xfrm>
+          <a:prstGeom prst="roundRect">
+            <a:avLst/>
+          </a:prstGeom>
+          <a:solidFill>
+            <a:srgbClr val="FFC000"/>
+          </a:solidFill>
+          <a:ln>
+            <a:noFill/>
+          </a:ln>
+        </p:spPr>
+        <p:style>
+          <a:lnRef idx="2">
+            <a:schemeClr val="accent1">
+              <a:shade val="50000"/>
+            </a:schemeClr>
+          </a:lnRef>
+          <a:fillRef idx="1">
+            <a:schemeClr val="accent1"/>
+          </a:fillRef>
+          <a:effectRef idx="0">
+            <a:schemeClr val="accent1"/>
+          </a:effectRef>
+          <a:fontRef idx="minor">
+            <a:schemeClr val="lt1"/>
+          </a:fontRef>
+        </p:style>
+        <p:txBody>
+          <a:bodyPr rtlCol="0" anchor="ctr"/>
+          <a:lstStyle/>
+          <a:p>
+            <a:pPr algn="ctr"/>
+            <a:r>
+              <a:rPr lang="en-GB" err="1"/>
+              <a:t>Huỷ</a:t>
+            </a:r>
+            <a:endParaRPr lang="en-GB"/>
+          </a:p>
+        </p:txBody>
+      </p:sp>
+    </p:spTree>
+    <p:extLst>
+      <p:ext uri="{BB962C8B-B14F-4D97-AF65-F5344CB8AC3E}">
+        <p14:creationId xmlns:p14="http://schemas.microsoft.com/office/powerpoint/2010/main" val="3282314784"/>
+      </p:ext>
+    </p:extLst>
+  </p:cSld>
+  <p:clrMapOvr>
+    <a:masterClrMapping/>
+  </p:clrMapOvr>
+</p:sld>
+</file>
+
+<file path=ppt/slides/slide23.xml><?xml version="1.0" encoding="utf-8"?>
+<p:sld xmlns:a="http://schemas.openxmlformats.org/drawingml/2006/main" xmlns:r="http://schemas.openxmlformats.org/officeDocument/2006/relationships" xmlns:p="http://schemas.openxmlformats.org/presentationml/2006/main">
+  <p:cSld>
+    <p:spTree>
+      <p:nvGrpSpPr>
+        <p:cNvPr id="1" name=""/>
+        <p:cNvGrpSpPr/>
+        <p:nvPr/>
+      </p:nvGrpSpPr>
+      <p:grpSpPr>
+        <a:xfrm>
+          <a:off x="0" y="0"/>
+          <a:ext cx="0" cy="0"/>
+          <a:chOff x="0" y="0"/>
+          <a:chExt cx="0" cy="0"/>
+        </a:xfrm>
+      </p:grpSpPr>
+      <p:sp>
+        <p:nvSpPr>
+          <p:cNvPr id="2" name="TextBox 1"/>
+          <p:cNvSpPr txBox="1"/>
+          <p:nvPr/>
+        </p:nvSpPr>
+        <p:spPr>
+          <a:xfrm>
+            <a:off x="611559" y="251356"/>
+            <a:ext cx="8264687" cy="461665"/>
+          </a:xfrm>
+          <a:prstGeom prst="rect">
+            <a:avLst/>
+          </a:prstGeom>
+          <a:noFill/>
+        </p:spPr>
+        <p:txBody>
+          <a:bodyPr wrap="square" rtlCol="0">
+            <a:spAutoFit/>
+          </a:bodyPr>
+          <a:lstStyle/>
+          <a:p>
+            <a:r>
+              <a:rPr lang="en-GB" sz="2400"/>
+              <a:t>Danh sách chuyên ngành </a:t>
+            </a:r>
+            <a:r>
+              <a:rPr lang="en-GB" sz="2400"/>
+              <a:t>nghiên cứu của giảng </a:t>
+            </a:r>
+            <a:r>
+              <a:rPr lang="en-GB" sz="2400" smtClean="0"/>
+              <a:t>viên</a:t>
+            </a:r>
+            <a:endParaRPr lang="en-GB" sz="2400"/>
+          </a:p>
+        </p:txBody>
+      </p:sp>
+      <p:cxnSp>
+        <p:nvCxnSpPr>
+          <p:cNvPr id="3" name="Straight Connector 2"/>
+          <p:cNvCxnSpPr/>
+          <p:nvPr/>
+        </p:nvCxnSpPr>
+        <p:spPr>
+          <a:xfrm>
+            <a:off x="611560" y="764704"/>
+            <a:ext cx="8264687" cy="0"/>
+          </a:xfrm>
+          <a:prstGeom prst="line">
+            <a:avLst/>
+          </a:prstGeom>
+        </p:spPr>
+        <p:style>
+          <a:lnRef idx="1">
+            <a:schemeClr val="accent1"/>
+          </a:lnRef>
+          <a:fillRef idx="0">
+            <a:schemeClr val="accent1"/>
+          </a:fillRef>
+          <a:effectRef idx="0">
+            <a:schemeClr val="accent1"/>
+          </a:effectRef>
+          <a:fontRef idx="minor">
+            <a:schemeClr val="tx1"/>
+          </a:fontRef>
+        </p:style>
+      </p:cxnSp>
+      <p:graphicFrame>
+        <p:nvGraphicFramePr>
+          <p:cNvPr id="14" name="Table 13"/>
+          <p:cNvGraphicFramePr>
+            <a:graphicFrameLocks noGrp="1"/>
+          </p:cNvGraphicFramePr>
+          <p:nvPr>
+            <p:extLst>
+              <p:ext uri="{D42A27DB-BD31-4B8C-83A1-F6EECF244321}">
+                <p14:modId xmlns:p14="http://schemas.microsoft.com/office/powerpoint/2010/main" val="3240690716"/>
+              </p:ext>
+            </p:extLst>
+          </p:nvPr>
+        </p:nvGraphicFramePr>
+        <p:xfrm>
+          <a:off x="1648864" y="2052280"/>
+          <a:ext cx="5371408" cy="1381760"/>
+        </p:xfrm>
+        <a:graphic>
+          <a:graphicData uri="http://schemas.openxmlformats.org/drawingml/2006/table">
+            <a:tbl>
+              <a:tblPr firstRow="1" bandRow="1">
+                <a:tableStyleId>{5C22544A-7EE6-4342-B048-85BDC9FD1C3A}</a:tableStyleId>
+              </a:tblPr>
+              <a:tblGrid>
+                <a:gridCol w="467081"/>
+                <a:gridCol w="1634776"/>
+                <a:gridCol w="1428483"/>
+                <a:gridCol w="1841068"/>
+              </a:tblGrid>
+              <a:tr h="370840">
+                <a:tc>
+                  <a:txBody>
+                    <a:bodyPr/>
+                    <a:lstStyle/>
+                    <a:p>
+                      <a:r>
+                        <a:rPr lang="en-GB" smtClean="0">
+                          <a:solidFill>
+                            <a:schemeClr val="tx1"/>
+                          </a:solidFill>
+                        </a:rPr>
+                        <a:t>STT</a:t>
+                      </a:r>
+                      <a:endParaRPr lang="en-GB">
+                        <a:solidFill>
+                          <a:schemeClr val="tx1"/>
+                        </a:solidFill>
+                      </a:endParaRPr>
+                    </a:p>
+                  </a:txBody>
+                  <a:tcPr>
+                    <a:lnL w="12700" cap="flat" cmpd="sng" algn="ctr">
+                      <a:solidFill>
+                        <a:schemeClr val="tx1"/>
+                      </a:solidFill>
+                      <a:prstDash val="solid"/>
+                      <a:round/>
+                      <a:headEnd type="none" w="med" len="med"/>
+                      <a:tailEnd type="none" w="med" len="med"/>
+                    </a:lnL>
+                    <a:lnR w="12700" cap="flat" cmpd="sng" algn="ctr">
+                      <a:solidFill>
+                        <a:schemeClr val="tx1"/>
+                      </a:solidFill>
+                      <a:prstDash val="solid"/>
+                      <a:round/>
+                      <a:headEnd type="none" w="med" len="med"/>
+                      <a:tailEnd type="none" w="med" len="med"/>
+                    </a:lnR>
+                    <a:lnT w="12700" cap="flat" cmpd="sng" algn="ctr">
+                      <a:solidFill>
+                        <a:schemeClr val="tx1"/>
+                      </a:solidFill>
+                      <a:prstDash val="solid"/>
+                      <a:round/>
+                      <a:headEnd type="none" w="med" len="med"/>
+                      <a:tailEnd type="none" w="med" len="med"/>
+                    </a:lnT>
+                    <a:lnB w="12700" cap="flat" cmpd="sng" algn="ctr">
+                      <a:solidFill>
+                        <a:schemeClr val="tx1"/>
+                      </a:solidFill>
+                      <a:prstDash val="solid"/>
+                      <a:round/>
+                      <a:headEnd type="none" w="med" len="med"/>
+                      <a:tailEnd type="none" w="med" len="med"/>
+                    </a:lnB>
+                    <a:noFill/>
+                  </a:tcPr>
+                </a:tc>
+                <a:tc>
+                  <a:txBody>
+                    <a:bodyPr/>
+                    <a:lstStyle/>
+                    <a:p>
+                      <a:r>
+                        <a:rPr lang="en-GB" smtClean="0">
+                          <a:solidFill>
+                            <a:schemeClr val="tx1"/>
+                          </a:solidFill>
+                        </a:rPr>
+                        <a:t>Chuyên ngành nghiên cứu</a:t>
+                      </a:r>
+                      <a:endParaRPr lang="en-GB">
+                        <a:solidFill>
+                          <a:schemeClr val="tx1"/>
+                        </a:solidFill>
+                      </a:endParaRPr>
+                    </a:p>
+                  </a:txBody>
+                  <a:tcPr>
+                    <a:lnL w="12700" cap="flat" cmpd="sng" algn="ctr">
+                      <a:solidFill>
+                        <a:schemeClr val="tx1"/>
+                      </a:solidFill>
+                      <a:prstDash val="solid"/>
+                      <a:round/>
+                      <a:headEnd type="none" w="med" len="med"/>
+                      <a:tailEnd type="none" w="med" len="med"/>
+                    </a:lnL>
+                    <a:lnR w="12700" cap="flat" cmpd="sng" algn="ctr">
+                      <a:solidFill>
+                        <a:schemeClr val="tx1"/>
+                      </a:solidFill>
+                      <a:prstDash val="solid"/>
+                      <a:round/>
+                      <a:headEnd type="none" w="med" len="med"/>
+                      <a:tailEnd type="none" w="med" len="med"/>
+                    </a:lnR>
+                    <a:lnT w="12700" cap="flat" cmpd="sng" algn="ctr">
+                      <a:solidFill>
+                        <a:schemeClr val="tx1"/>
+                      </a:solidFill>
+                      <a:prstDash val="solid"/>
+                      <a:round/>
+                      <a:headEnd type="none" w="med" len="med"/>
+                      <a:tailEnd type="none" w="med" len="med"/>
+                    </a:lnT>
+                    <a:lnB w="12700" cap="flat" cmpd="sng" algn="ctr">
+                      <a:solidFill>
+                        <a:schemeClr val="tx1"/>
+                      </a:solidFill>
+                      <a:prstDash val="solid"/>
+                      <a:round/>
+                      <a:headEnd type="none" w="med" len="med"/>
+                      <a:tailEnd type="none" w="med" len="med"/>
+                    </a:lnB>
+                    <a:noFill/>
+                  </a:tcPr>
+                </a:tc>
+                <a:tc>
+                  <a:txBody>
+                    <a:bodyPr/>
+                    <a:lstStyle/>
+                    <a:p>
+                      <a:r>
+                        <a:rPr lang="en-GB" smtClean="0">
+                          <a:solidFill>
+                            <a:schemeClr val="tx1"/>
+                          </a:solidFill>
+                        </a:rPr>
+                        <a:t>Từ ngày</a:t>
+                      </a:r>
+                      <a:endParaRPr lang="en-GB">
+                        <a:solidFill>
+                          <a:schemeClr val="tx1"/>
+                        </a:solidFill>
+                      </a:endParaRPr>
+                    </a:p>
+                  </a:txBody>
+                  <a:tcPr>
+                    <a:lnL w="12700" cap="flat" cmpd="sng" algn="ctr">
+                      <a:solidFill>
+                        <a:schemeClr val="tx1"/>
+                      </a:solidFill>
+                      <a:prstDash val="solid"/>
+                      <a:round/>
+                      <a:headEnd type="none" w="med" len="med"/>
+                      <a:tailEnd type="none" w="med" len="med"/>
+                    </a:lnL>
+                    <a:lnR w="12700" cap="flat" cmpd="sng" algn="ctr">
+                      <a:solidFill>
+                        <a:schemeClr val="tx1"/>
+                      </a:solidFill>
+                      <a:prstDash val="solid"/>
+                      <a:round/>
+                      <a:headEnd type="none" w="med" len="med"/>
+                      <a:tailEnd type="none" w="med" len="med"/>
+                    </a:lnR>
+                    <a:lnT w="12700" cap="flat" cmpd="sng" algn="ctr">
+                      <a:solidFill>
+                        <a:schemeClr val="tx1"/>
+                      </a:solidFill>
+                      <a:prstDash val="solid"/>
+                      <a:round/>
+                      <a:headEnd type="none" w="med" len="med"/>
+                      <a:tailEnd type="none" w="med" len="med"/>
+                    </a:lnT>
+                    <a:lnB w="12700" cap="flat" cmpd="sng" algn="ctr">
+                      <a:solidFill>
+                        <a:schemeClr val="tx1"/>
+                      </a:solidFill>
+                      <a:prstDash val="solid"/>
+                      <a:round/>
+                      <a:headEnd type="none" w="med" len="med"/>
+                      <a:tailEnd type="none" w="med" len="med"/>
+                    </a:lnB>
+                    <a:noFill/>
+                  </a:tcPr>
+                </a:tc>
+                <a:tc>
+                  <a:txBody>
+                    <a:bodyPr/>
+                    <a:lstStyle/>
+                    <a:p>
+                      <a:r>
+                        <a:rPr lang="en-GB" smtClean="0">
+                          <a:solidFill>
+                            <a:schemeClr val="tx1"/>
+                          </a:solidFill>
+                        </a:rPr>
+                        <a:t>Đến ngày</a:t>
+                      </a:r>
+                      <a:endParaRPr lang="en-GB">
+                        <a:solidFill>
+                          <a:schemeClr val="tx1"/>
+                        </a:solidFill>
+                      </a:endParaRPr>
+                    </a:p>
+                  </a:txBody>
+                  <a:tcPr>
+                    <a:lnL w="12700" cap="flat" cmpd="sng" algn="ctr">
+                      <a:solidFill>
+                        <a:schemeClr val="tx1"/>
+                      </a:solidFill>
+                      <a:prstDash val="solid"/>
+                      <a:round/>
+                      <a:headEnd type="none" w="med" len="med"/>
+                      <a:tailEnd type="none" w="med" len="med"/>
+                    </a:lnL>
+                    <a:lnR w="12700" cap="flat" cmpd="sng" algn="ctr">
+                      <a:solidFill>
+                        <a:schemeClr val="tx1"/>
+                      </a:solidFill>
+                      <a:prstDash val="solid"/>
+                      <a:round/>
+                      <a:headEnd type="none" w="med" len="med"/>
+                      <a:tailEnd type="none" w="med" len="med"/>
+                    </a:lnR>
+                    <a:lnT w="12700" cap="flat" cmpd="sng" algn="ctr">
+                      <a:solidFill>
+                        <a:schemeClr val="tx1"/>
+                      </a:solidFill>
+                      <a:prstDash val="solid"/>
+                      <a:round/>
+                      <a:headEnd type="none" w="med" len="med"/>
+                      <a:tailEnd type="none" w="med" len="med"/>
+                    </a:lnT>
+                    <a:lnB w="12700" cap="flat" cmpd="sng" algn="ctr">
+                      <a:solidFill>
+                        <a:schemeClr val="tx1"/>
+                      </a:solidFill>
+                      <a:prstDash val="solid"/>
+                      <a:round/>
+                      <a:headEnd type="none" w="med" len="med"/>
+                      <a:tailEnd type="none" w="med" len="med"/>
+                    </a:lnB>
+                    <a:noFill/>
+                  </a:tcPr>
+                </a:tc>
+              </a:tr>
+              <a:tr h="370840">
+                <a:tc>
+                  <a:txBody>
+                    <a:bodyPr/>
+                    <a:lstStyle/>
+                    <a:p>
+                      <a:r>
+                        <a:rPr lang="en-GB" smtClean="0">
+                          <a:solidFill>
+                            <a:schemeClr val="tx1"/>
+                          </a:solidFill>
+                        </a:rPr>
+                        <a:t>1</a:t>
+                      </a:r>
+                      <a:endParaRPr lang="en-GB">
+                        <a:solidFill>
+                          <a:schemeClr val="tx1"/>
+                        </a:solidFill>
+                      </a:endParaRPr>
+                    </a:p>
+                  </a:txBody>
+                  <a:tcPr>
+                    <a:lnL w="12700" cap="flat" cmpd="sng" algn="ctr">
+                      <a:solidFill>
+                        <a:schemeClr val="tx1"/>
+                      </a:solidFill>
+                      <a:prstDash val="solid"/>
+                      <a:round/>
+                      <a:headEnd type="none" w="med" len="med"/>
+                      <a:tailEnd type="none" w="med" len="med"/>
+                    </a:lnL>
+                    <a:lnR w="12700" cap="flat" cmpd="sng" algn="ctr">
+                      <a:solidFill>
+                        <a:schemeClr val="tx1"/>
+                      </a:solidFill>
+                      <a:prstDash val="solid"/>
+                      <a:round/>
+                      <a:headEnd type="none" w="med" len="med"/>
+                      <a:tailEnd type="none" w="med" len="med"/>
+                    </a:lnR>
+                    <a:lnT w="12700" cap="flat" cmpd="sng" algn="ctr">
+                      <a:solidFill>
+                        <a:schemeClr val="tx1"/>
+                      </a:solidFill>
+                      <a:prstDash val="solid"/>
+                      <a:round/>
+                      <a:headEnd type="none" w="med" len="med"/>
+                      <a:tailEnd type="none" w="med" len="med"/>
+                    </a:lnT>
+                    <a:lnB w="12700" cap="flat" cmpd="sng" algn="ctr">
+                      <a:solidFill>
+                        <a:schemeClr val="tx1"/>
+                      </a:solidFill>
+                      <a:prstDash val="solid"/>
+                      <a:round/>
+                      <a:headEnd type="none" w="med" len="med"/>
+                      <a:tailEnd type="none" w="med" len="med"/>
+                    </a:lnB>
+                    <a:noFill/>
+                  </a:tcPr>
+                </a:tc>
+                <a:tc>
+                  <a:txBody>
+                    <a:bodyPr/>
+                    <a:lstStyle/>
+                    <a:p>
+                      <a:endParaRPr lang="en-GB">
+                        <a:solidFill>
+                          <a:schemeClr val="tx1"/>
+                        </a:solidFill>
+                      </a:endParaRPr>
+                    </a:p>
+                  </a:txBody>
+                  <a:tcPr>
+                    <a:lnL w="12700" cap="flat" cmpd="sng" algn="ctr">
+                      <a:solidFill>
+                        <a:schemeClr val="tx1"/>
+                      </a:solidFill>
+                      <a:prstDash val="solid"/>
+                      <a:round/>
+                      <a:headEnd type="none" w="med" len="med"/>
+                      <a:tailEnd type="none" w="med" len="med"/>
+                    </a:lnL>
+                    <a:lnR w="12700" cap="flat" cmpd="sng" algn="ctr">
+                      <a:solidFill>
+                        <a:schemeClr val="tx1"/>
+                      </a:solidFill>
+                      <a:prstDash val="solid"/>
+                      <a:round/>
+                      <a:headEnd type="none" w="med" len="med"/>
+                      <a:tailEnd type="none" w="med" len="med"/>
+                    </a:lnR>
+                    <a:lnT w="12700" cap="flat" cmpd="sng" algn="ctr">
+                      <a:solidFill>
+                        <a:schemeClr val="tx1"/>
+                      </a:solidFill>
+                      <a:prstDash val="solid"/>
+                      <a:round/>
+                      <a:headEnd type="none" w="med" len="med"/>
+                      <a:tailEnd type="none" w="med" len="med"/>
+                    </a:lnT>
+                    <a:lnB w="12700" cap="flat" cmpd="sng" algn="ctr">
+                      <a:solidFill>
+                        <a:schemeClr val="tx1"/>
+                      </a:solidFill>
+                      <a:prstDash val="solid"/>
+                      <a:round/>
+                      <a:headEnd type="none" w="med" len="med"/>
+                      <a:tailEnd type="none" w="med" len="med"/>
+                    </a:lnB>
+                    <a:noFill/>
+                  </a:tcPr>
+                </a:tc>
+                <a:tc>
+                  <a:txBody>
+                    <a:bodyPr/>
+                    <a:lstStyle/>
+                    <a:p>
+                      <a:endParaRPr lang="en-GB">
+                        <a:solidFill>
+                          <a:schemeClr val="tx1"/>
+                        </a:solidFill>
+                      </a:endParaRPr>
+                    </a:p>
+                  </a:txBody>
+                  <a:tcPr>
+                    <a:lnL w="12700" cap="flat" cmpd="sng" algn="ctr">
+                      <a:solidFill>
+                        <a:schemeClr val="tx1"/>
+                      </a:solidFill>
+                      <a:prstDash val="solid"/>
+                      <a:round/>
+                      <a:headEnd type="none" w="med" len="med"/>
+                      <a:tailEnd type="none" w="med" len="med"/>
+                    </a:lnL>
+                    <a:lnR w="12700" cap="flat" cmpd="sng" algn="ctr">
+                      <a:solidFill>
+                        <a:schemeClr val="tx1"/>
+                      </a:solidFill>
+                      <a:prstDash val="solid"/>
+                      <a:round/>
+                      <a:headEnd type="none" w="med" len="med"/>
+                      <a:tailEnd type="none" w="med" len="med"/>
+                    </a:lnR>
+                    <a:lnT w="12700" cap="flat" cmpd="sng" algn="ctr">
+                      <a:solidFill>
+                        <a:schemeClr val="tx1"/>
+                      </a:solidFill>
+                      <a:prstDash val="solid"/>
+                      <a:round/>
+                      <a:headEnd type="none" w="med" len="med"/>
+                      <a:tailEnd type="none" w="med" len="med"/>
+                    </a:lnT>
+                    <a:lnB w="12700" cap="flat" cmpd="sng" algn="ctr">
+                      <a:solidFill>
+                        <a:schemeClr val="tx1"/>
+                      </a:solidFill>
+                      <a:prstDash val="solid"/>
+                      <a:round/>
+                      <a:headEnd type="none" w="med" len="med"/>
+                      <a:tailEnd type="none" w="med" len="med"/>
+                    </a:lnB>
+                    <a:noFill/>
+                  </a:tcPr>
+                </a:tc>
+                <a:tc>
+                  <a:txBody>
+                    <a:bodyPr/>
+                    <a:lstStyle/>
+                    <a:p>
+                      <a:endParaRPr lang="en-GB">
+                        <a:solidFill>
+                          <a:schemeClr val="tx1"/>
+                        </a:solidFill>
+                      </a:endParaRPr>
+                    </a:p>
+                  </a:txBody>
+                  <a:tcPr>
+                    <a:lnL w="12700" cap="flat" cmpd="sng" algn="ctr">
+                      <a:solidFill>
+                        <a:schemeClr val="tx1"/>
+                      </a:solidFill>
+                      <a:prstDash val="solid"/>
+                      <a:round/>
+                      <a:headEnd type="none" w="med" len="med"/>
+                      <a:tailEnd type="none" w="med" len="med"/>
+                    </a:lnL>
+                    <a:lnR w="12700" cap="flat" cmpd="sng" algn="ctr">
+                      <a:solidFill>
+                        <a:schemeClr val="tx1"/>
+                      </a:solidFill>
+                      <a:prstDash val="solid"/>
+                      <a:round/>
+                      <a:headEnd type="none" w="med" len="med"/>
+                      <a:tailEnd type="none" w="med" len="med"/>
+                    </a:lnR>
+                    <a:lnT w="12700" cap="flat" cmpd="sng" algn="ctr">
+                      <a:solidFill>
+                        <a:schemeClr val="tx1"/>
+                      </a:solidFill>
+                      <a:prstDash val="solid"/>
+                      <a:round/>
+                      <a:headEnd type="none" w="med" len="med"/>
+                      <a:tailEnd type="none" w="med" len="med"/>
+                    </a:lnT>
+                    <a:lnB w="12700" cap="flat" cmpd="sng" algn="ctr">
+                      <a:solidFill>
+                        <a:schemeClr val="tx1"/>
+                      </a:solidFill>
+                      <a:prstDash val="solid"/>
+                      <a:round/>
+                      <a:headEnd type="none" w="med" len="med"/>
+                      <a:tailEnd type="none" w="med" len="med"/>
+                    </a:lnB>
+                    <a:noFill/>
+                  </a:tcPr>
+                </a:tc>
+              </a:tr>
+              <a:tr h="370840">
+                <a:tc>
+                  <a:txBody>
+                    <a:bodyPr/>
+                    <a:lstStyle/>
+                    <a:p>
+                      <a:r>
+                        <a:rPr lang="en-GB" smtClean="0">
+                          <a:solidFill>
+                            <a:schemeClr val="tx1"/>
+                          </a:solidFill>
+                        </a:rPr>
+                        <a:t>2</a:t>
+                      </a:r>
+                      <a:endParaRPr lang="en-GB">
+                        <a:solidFill>
+                          <a:schemeClr val="tx1"/>
+                        </a:solidFill>
+                      </a:endParaRPr>
+                    </a:p>
+                  </a:txBody>
+                  <a:tcPr>
+                    <a:lnL w="12700" cap="flat" cmpd="sng" algn="ctr">
+                      <a:solidFill>
+                        <a:schemeClr val="tx1"/>
+                      </a:solidFill>
+                      <a:prstDash val="solid"/>
+                      <a:round/>
+                      <a:headEnd type="none" w="med" len="med"/>
+                      <a:tailEnd type="none" w="med" len="med"/>
+                    </a:lnL>
+                    <a:lnR w="12700" cap="flat" cmpd="sng" algn="ctr">
+                      <a:solidFill>
+                        <a:schemeClr val="tx1"/>
+                      </a:solidFill>
+                      <a:prstDash val="solid"/>
+                      <a:round/>
+                      <a:headEnd type="none" w="med" len="med"/>
+                      <a:tailEnd type="none" w="med" len="med"/>
+                    </a:lnR>
+                    <a:lnT w="12700" cap="flat" cmpd="sng" algn="ctr">
+                      <a:solidFill>
+                        <a:schemeClr val="tx1"/>
+                      </a:solidFill>
+                      <a:prstDash val="solid"/>
+                      <a:round/>
+                      <a:headEnd type="none" w="med" len="med"/>
+                      <a:tailEnd type="none" w="med" len="med"/>
+                    </a:lnT>
+                    <a:lnB w="12700" cap="flat" cmpd="sng" algn="ctr">
+                      <a:solidFill>
+                        <a:schemeClr val="tx1"/>
+                      </a:solidFill>
+                      <a:prstDash val="solid"/>
+                      <a:round/>
+                      <a:headEnd type="none" w="med" len="med"/>
+                      <a:tailEnd type="none" w="med" len="med"/>
+                    </a:lnB>
+                    <a:noFill/>
+                  </a:tcPr>
+                </a:tc>
+                <a:tc>
+                  <a:txBody>
+                    <a:bodyPr/>
+                    <a:lstStyle/>
+                    <a:p>
+                      <a:endParaRPr lang="en-GB">
+                        <a:solidFill>
+                          <a:schemeClr val="tx1"/>
+                        </a:solidFill>
+                      </a:endParaRPr>
+                    </a:p>
+                  </a:txBody>
+                  <a:tcPr>
+                    <a:lnL w="12700" cap="flat" cmpd="sng" algn="ctr">
+                      <a:solidFill>
+                        <a:schemeClr val="tx1"/>
+                      </a:solidFill>
+                      <a:prstDash val="solid"/>
+                      <a:round/>
+                      <a:headEnd type="none" w="med" len="med"/>
+                      <a:tailEnd type="none" w="med" len="med"/>
+                    </a:lnL>
+                    <a:lnR w="12700" cap="flat" cmpd="sng" algn="ctr">
+                      <a:solidFill>
+                        <a:schemeClr val="tx1"/>
+                      </a:solidFill>
+                      <a:prstDash val="solid"/>
+                      <a:round/>
+                      <a:headEnd type="none" w="med" len="med"/>
+                      <a:tailEnd type="none" w="med" len="med"/>
+                    </a:lnR>
+                    <a:lnT w="12700" cap="flat" cmpd="sng" algn="ctr">
+                      <a:solidFill>
+                        <a:schemeClr val="tx1"/>
+                      </a:solidFill>
+                      <a:prstDash val="solid"/>
+                      <a:round/>
+                      <a:headEnd type="none" w="med" len="med"/>
+                      <a:tailEnd type="none" w="med" len="med"/>
+                    </a:lnT>
+                    <a:lnB w="12700" cap="flat" cmpd="sng" algn="ctr">
+                      <a:solidFill>
+                        <a:schemeClr val="tx1"/>
+                      </a:solidFill>
+                      <a:prstDash val="solid"/>
+                      <a:round/>
+                      <a:headEnd type="none" w="med" len="med"/>
+                      <a:tailEnd type="none" w="med" len="med"/>
+                    </a:lnB>
+                    <a:noFill/>
+                  </a:tcPr>
+                </a:tc>
+                <a:tc>
+                  <a:txBody>
+                    <a:bodyPr/>
+                    <a:lstStyle/>
+                    <a:p>
+                      <a:endParaRPr lang="en-GB">
+                        <a:solidFill>
+                          <a:schemeClr val="tx1"/>
+                        </a:solidFill>
+                      </a:endParaRPr>
+                    </a:p>
+                  </a:txBody>
+                  <a:tcPr>
+                    <a:lnL w="12700" cap="flat" cmpd="sng" algn="ctr">
+                      <a:solidFill>
+                        <a:schemeClr val="tx1"/>
+                      </a:solidFill>
+                      <a:prstDash val="solid"/>
+                      <a:round/>
+                      <a:headEnd type="none" w="med" len="med"/>
+                      <a:tailEnd type="none" w="med" len="med"/>
+                    </a:lnL>
+                    <a:lnR w="12700" cap="flat" cmpd="sng" algn="ctr">
+                      <a:solidFill>
+                        <a:schemeClr val="tx1"/>
+                      </a:solidFill>
+                      <a:prstDash val="solid"/>
+                      <a:round/>
+                      <a:headEnd type="none" w="med" len="med"/>
+                      <a:tailEnd type="none" w="med" len="med"/>
+                    </a:lnR>
+                    <a:lnT w="12700" cap="flat" cmpd="sng" algn="ctr">
+                      <a:solidFill>
+                        <a:schemeClr val="tx1"/>
+                      </a:solidFill>
+                      <a:prstDash val="solid"/>
+                      <a:round/>
+                      <a:headEnd type="none" w="med" len="med"/>
+                      <a:tailEnd type="none" w="med" len="med"/>
+                    </a:lnT>
+                    <a:lnB w="12700" cap="flat" cmpd="sng" algn="ctr">
+                      <a:solidFill>
+                        <a:schemeClr val="tx1"/>
+                      </a:solidFill>
+                      <a:prstDash val="solid"/>
+                      <a:round/>
+                      <a:headEnd type="none" w="med" len="med"/>
+                      <a:tailEnd type="none" w="med" len="med"/>
+                    </a:lnB>
+                    <a:noFill/>
+                  </a:tcPr>
+                </a:tc>
+                <a:tc>
+                  <a:txBody>
+                    <a:bodyPr/>
+                    <a:lstStyle/>
+                    <a:p>
+                      <a:endParaRPr lang="en-GB">
+                        <a:solidFill>
+                          <a:schemeClr val="tx1"/>
+                        </a:solidFill>
+                      </a:endParaRPr>
+                    </a:p>
+                  </a:txBody>
+                  <a:tcPr>
+                    <a:lnL w="12700" cap="flat" cmpd="sng" algn="ctr">
+                      <a:solidFill>
+                        <a:schemeClr val="tx1"/>
+                      </a:solidFill>
+                      <a:prstDash val="solid"/>
+                      <a:round/>
+                      <a:headEnd type="none" w="med" len="med"/>
+                      <a:tailEnd type="none" w="med" len="med"/>
+                    </a:lnL>
+                    <a:lnR w="12700" cap="flat" cmpd="sng" algn="ctr">
+                      <a:solidFill>
+                        <a:schemeClr val="tx1"/>
+                      </a:solidFill>
+                      <a:prstDash val="solid"/>
+                      <a:round/>
+                      <a:headEnd type="none" w="med" len="med"/>
+                      <a:tailEnd type="none" w="med" len="med"/>
+                    </a:lnR>
+                    <a:lnT w="12700" cap="flat" cmpd="sng" algn="ctr">
+                      <a:solidFill>
+                        <a:schemeClr val="tx1"/>
+                      </a:solidFill>
+                      <a:prstDash val="solid"/>
+                      <a:round/>
+                      <a:headEnd type="none" w="med" len="med"/>
+                      <a:tailEnd type="none" w="med" len="med"/>
+                    </a:lnT>
+                    <a:lnB w="12700" cap="flat" cmpd="sng" algn="ctr">
+                      <a:solidFill>
+                        <a:schemeClr val="tx1"/>
+                      </a:solidFill>
+                      <a:prstDash val="solid"/>
+                      <a:round/>
+                      <a:headEnd type="none" w="med" len="med"/>
+                      <a:tailEnd type="none" w="med" len="med"/>
+                    </a:lnB>
+                    <a:noFill/>
+                  </a:tcPr>
+                </a:tc>
+              </a:tr>
+            </a:tbl>
+          </a:graphicData>
+        </a:graphic>
+      </p:graphicFrame>
+      <p:sp>
+        <p:nvSpPr>
+          <p:cNvPr id="15" name="Rounded Rectangle 14"/>
+          <p:cNvSpPr/>
+          <p:nvPr/>
+        </p:nvSpPr>
+        <p:spPr>
+          <a:xfrm>
+            <a:off x="5436096" y="1268760"/>
+            <a:ext cx="1512168" cy="576064"/>
+          </a:xfrm>
+          <a:prstGeom prst="roundRect">
+            <a:avLst/>
+          </a:prstGeom>
+        </p:spPr>
+        <p:style>
+          <a:lnRef idx="2">
+            <a:schemeClr val="accent1">
+              <a:shade val="50000"/>
+            </a:schemeClr>
+          </a:lnRef>
+          <a:fillRef idx="1">
+            <a:schemeClr val="accent1"/>
+          </a:fillRef>
+          <a:effectRef idx="0">
+            <a:schemeClr val="accent1"/>
+          </a:effectRef>
+          <a:fontRef idx="minor">
+            <a:schemeClr val="lt1"/>
+          </a:fontRef>
+        </p:style>
+        <p:txBody>
+          <a:bodyPr rtlCol="0" anchor="ctr"/>
+          <a:lstStyle/>
+          <a:p>
+            <a:pPr algn="ctr"/>
+            <a:r>
+              <a:rPr lang="en-GB" err="1" smtClean="0"/>
+              <a:t>Thêm</a:t>
+            </a:r>
+            <a:endParaRPr lang="en-GB"/>
+          </a:p>
+        </p:txBody>
+      </p:sp>
+    </p:spTree>
+    <p:extLst>
+      <p:ext uri="{BB962C8B-B14F-4D97-AF65-F5344CB8AC3E}">
+        <p14:creationId xmlns:p14="http://schemas.microsoft.com/office/powerpoint/2010/main" val="904765992"/>
+      </p:ext>
+    </p:extLst>
+  </p:cSld>
+  <p:clrMapOvr>
+    <a:masterClrMapping/>
+  </p:clrMapOvr>
+</p:sld>
+</file>
+
+<file path=ppt/slides/slide24.xml><?xml version="1.0" encoding="utf-8"?>
+<p:sld xmlns:a="http://schemas.openxmlformats.org/drawingml/2006/main" xmlns:r="http://schemas.openxmlformats.org/officeDocument/2006/relationships" xmlns:p="http://schemas.openxmlformats.org/presentationml/2006/main">
+  <p:cSld>
+    <p:spTree>
+      <p:nvGrpSpPr>
+        <p:cNvPr id="1" name=""/>
+        <p:cNvGrpSpPr/>
+        <p:nvPr/>
+      </p:nvGrpSpPr>
+      <p:grpSpPr>
+        <a:xfrm>
+          <a:off x="0" y="0"/>
+          <a:ext cx="0" cy="0"/>
+          <a:chOff x="0" y="0"/>
+          <a:chExt cx="0" cy="0"/>
+        </a:xfrm>
+      </p:grpSpPr>
+      <p:sp>
+        <p:nvSpPr>
+          <p:cNvPr id="2" name="TextBox 1"/>
+          <p:cNvSpPr txBox="1"/>
+          <p:nvPr/>
+        </p:nvSpPr>
+        <p:spPr>
+          <a:xfrm>
+            <a:off x="611559" y="251356"/>
+            <a:ext cx="8264687" cy="461665"/>
+          </a:xfrm>
+          <a:prstGeom prst="rect">
+            <a:avLst/>
+          </a:prstGeom>
+          <a:noFill/>
+        </p:spPr>
+        <p:txBody>
+          <a:bodyPr wrap="square" rtlCol="0">
+            <a:spAutoFit/>
+          </a:bodyPr>
+          <a:lstStyle/>
+          <a:p>
+            <a:r>
+              <a:rPr lang="en-GB" sz="2400"/>
+              <a:t>Form Thêm </a:t>
+            </a:r>
+            <a:r>
+              <a:rPr lang="en-GB" sz="2400"/>
+              <a:t>chuyên ngành </a:t>
+            </a:r>
+            <a:r>
+              <a:rPr lang="en-GB" sz="2400"/>
+              <a:t>nghiên cứu của giảng </a:t>
+            </a:r>
+            <a:r>
+              <a:rPr lang="en-GB" sz="2400" smtClean="0"/>
+              <a:t>viên</a:t>
+            </a:r>
+            <a:endParaRPr lang="en-GB" sz="2400"/>
+          </a:p>
+        </p:txBody>
+      </p:sp>
+      <p:cxnSp>
+        <p:nvCxnSpPr>
+          <p:cNvPr id="3" name="Straight Connector 2"/>
+          <p:cNvCxnSpPr/>
+          <p:nvPr/>
+        </p:nvCxnSpPr>
+        <p:spPr>
+          <a:xfrm>
+            <a:off x="611560" y="764704"/>
+            <a:ext cx="8264687" cy="0"/>
+          </a:xfrm>
+          <a:prstGeom prst="line">
+            <a:avLst/>
+          </a:prstGeom>
+        </p:spPr>
+        <p:style>
+          <a:lnRef idx="1">
+            <a:schemeClr val="accent1"/>
+          </a:lnRef>
+          <a:fillRef idx="0">
+            <a:schemeClr val="accent1"/>
+          </a:fillRef>
+          <a:effectRef idx="0">
+            <a:schemeClr val="accent1"/>
+          </a:effectRef>
+          <a:fontRef idx="minor">
+            <a:schemeClr val="tx1"/>
+          </a:fontRef>
+        </p:style>
+      </p:cxnSp>
+      <p:sp>
+        <p:nvSpPr>
+          <p:cNvPr id="6" name="Rectangle 5"/>
+          <p:cNvSpPr/>
+          <p:nvPr/>
+        </p:nvSpPr>
+        <p:spPr>
+          <a:xfrm>
+            <a:off x="6084168" y="2818656"/>
+            <a:ext cx="1872208" cy="359278"/>
+          </a:xfrm>
+          <a:prstGeom prst="rect">
+            <a:avLst/>
+          </a:prstGeom>
+        </p:spPr>
+        <p:style>
+          <a:lnRef idx="2">
+            <a:schemeClr val="accent1">
+              <a:shade val="50000"/>
+            </a:schemeClr>
+          </a:lnRef>
+          <a:fillRef idx="1">
+            <a:schemeClr val="accent1"/>
+          </a:fillRef>
+          <a:effectRef idx="0">
+            <a:schemeClr val="accent1"/>
+          </a:effectRef>
+          <a:fontRef idx="minor">
+            <a:schemeClr val="lt1"/>
+          </a:fontRef>
+        </p:style>
+        <p:txBody>
+          <a:bodyPr rtlCol="0" anchor="ctr"/>
+          <a:lstStyle/>
+          <a:p>
+            <a:pPr algn="ctr"/>
+            <a:r>
+              <a:rPr lang="en-GB" smtClean="0"/>
+              <a:t>select-box </a:t>
+            </a:r>
+            <a:endParaRPr lang="en-GB"/>
+          </a:p>
+        </p:txBody>
+      </p:sp>
+      <p:sp>
+        <p:nvSpPr>
+          <p:cNvPr id="4" name="TextBox 3"/>
+          <p:cNvSpPr txBox="1"/>
+          <p:nvPr/>
+        </p:nvSpPr>
+        <p:spPr>
+          <a:xfrm>
+            <a:off x="2724409" y="2818656"/>
+            <a:ext cx="3024336" cy="369332"/>
+          </a:xfrm>
+          <a:prstGeom prst="rect">
+            <a:avLst/>
+          </a:prstGeom>
+          <a:noFill/>
+        </p:spPr>
+        <p:txBody>
+          <a:bodyPr wrap="square" rtlCol="0">
+            <a:spAutoFit/>
+          </a:bodyPr>
+          <a:lstStyle/>
+          <a:p>
+            <a:r>
+              <a:rPr lang="en-GB"/>
+              <a:t>Chuyên ngành nghiên cứu</a:t>
+            </a:r>
+          </a:p>
+        </p:txBody>
+      </p:sp>
+      <p:sp>
+        <p:nvSpPr>
+          <p:cNvPr id="8" name="Rectangle 7"/>
+          <p:cNvSpPr/>
+          <p:nvPr/>
+        </p:nvSpPr>
+        <p:spPr>
+          <a:xfrm>
+            <a:off x="6084168" y="3529444"/>
+            <a:ext cx="1872208" cy="359278"/>
+          </a:xfrm>
+          <a:prstGeom prst="rect">
+            <a:avLst/>
+          </a:prstGeom>
+        </p:spPr>
+        <p:style>
+          <a:lnRef idx="2">
+            <a:schemeClr val="accent1">
+              <a:shade val="50000"/>
+            </a:schemeClr>
+          </a:lnRef>
+          <a:fillRef idx="1">
+            <a:schemeClr val="accent1"/>
+          </a:fillRef>
+          <a:effectRef idx="0">
+            <a:schemeClr val="accent1"/>
+          </a:effectRef>
+          <a:fontRef idx="minor">
+            <a:schemeClr val="lt1"/>
+          </a:fontRef>
+        </p:style>
+        <p:txBody>
+          <a:bodyPr rtlCol="0" anchor="ctr"/>
+          <a:lstStyle/>
+          <a:p>
+            <a:pPr algn="ctr"/>
+            <a:r>
+              <a:rPr lang="en-GB" smtClean="0"/>
+              <a:t>date </a:t>
+            </a:r>
+            <a:endParaRPr lang="en-GB"/>
+          </a:p>
+        </p:txBody>
+      </p:sp>
+      <p:sp>
+        <p:nvSpPr>
+          <p:cNvPr id="9" name="TextBox 8"/>
+          <p:cNvSpPr txBox="1"/>
+          <p:nvPr/>
+        </p:nvSpPr>
+        <p:spPr>
+          <a:xfrm>
+            <a:off x="2724409" y="3529444"/>
+            <a:ext cx="3024336" cy="369332"/>
+          </a:xfrm>
+          <a:prstGeom prst="rect">
+            <a:avLst/>
+          </a:prstGeom>
+          <a:noFill/>
+        </p:spPr>
+        <p:txBody>
+          <a:bodyPr wrap="square" rtlCol="0">
+            <a:spAutoFit/>
+          </a:bodyPr>
+          <a:lstStyle/>
+          <a:p>
+            <a:r>
+              <a:rPr lang="en-GB"/>
+              <a:t>từ </a:t>
+            </a:r>
+            <a:r>
+              <a:rPr lang="en-GB"/>
+              <a:t>ngày  </a:t>
+            </a:r>
+            <a:r>
+              <a:rPr lang="en-GB"/>
+              <a:t>(bắt </a:t>
+            </a:r>
+            <a:r>
+              <a:rPr lang="en-GB" smtClean="0"/>
+              <a:t>buộc)</a:t>
+            </a:r>
+            <a:endParaRPr lang="en-GB"/>
+          </a:p>
+        </p:txBody>
+      </p:sp>
+      <p:sp>
+        <p:nvSpPr>
+          <p:cNvPr id="10" name="Rectangle 9"/>
+          <p:cNvSpPr/>
+          <p:nvPr/>
+        </p:nvSpPr>
+        <p:spPr>
+          <a:xfrm>
+            <a:off x="6084168" y="4186808"/>
+            <a:ext cx="1872208" cy="359278"/>
+          </a:xfrm>
+          <a:prstGeom prst="rect">
+            <a:avLst/>
+          </a:prstGeom>
+        </p:spPr>
+        <p:style>
+          <a:lnRef idx="2">
+            <a:schemeClr val="accent1">
+              <a:shade val="50000"/>
+            </a:schemeClr>
+          </a:lnRef>
+          <a:fillRef idx="1">
+            <a:schemeClr val="accent1"/>
+          </a:fillRef>
+          <a:effectRef idx="0">
+            <a:schemeClr val="accent1"/>
+          </a:effectRef>
+          <a:fontRef idx="minor">
+            <a:schemeClr val="lt1"/>
+          </a:fontRef>
+        </p:style>
+        <p:txBody>
+          <a:bodyPr rtlCol="0" anchor="ctr"/>
+          <a:lstStyle/>
+          <a:p>
+            <a:pPr algn="ctr"/>
+            <a:r>
+              <a:rPr lang="en-GB" smtClean="0"/>
+              <a:t>date</a:t>
+            </a:r>
+            <a:endParaRPr lang="en-GB"/>
+          </a:p>
+        </p:txBody>
+      </p:sp>
+      <p:sp>
+        <p:nvSpPr>
+          <p:cNvPr id="11" name="TextBox 10"/>
+          <p:cNvSpPr txBox="1"/>
+          <p:nvPr/>
+        </p:nvSpPr>
+        <p:spPr>
+          <a:xfrm>
+            <a:off x="2724409" y="4186808"/>
+            <a:ext cx="3024336" cy="369332"/>
+          </a:xfrm>
+          <a:prstGeom prst="rect">
+            <a:avLst/>
+          </a:prstGeom>
+          <a:noFill/>
+        </p:spPr>
+        <p:txBody>
+          <a:bodyPr wrap="square" rtlCol="0">
+            <a:spAutoFit/>
+          </a:bodyPr>
+          <a:lstStyle/>
+          <a:p>
+            <a:r>
+              <a:rPr lang="vi-VN" smtClean="0"/>
+              <a:t>Đến</a:t>
+            </a:r>
+            <a:r>
+              <a:rPr lang="en-GB"/>
+              <a:t> </a:t>
+            </a:r>
+            <a:r>
+              <a:rPr lang="en-GB" smtClean="0"/>
+              <a:t>ngày (th</a:t>
+            </a:r>
+            <a:r>
+              <a:rPr lang="vi-VN" smtClean="0"/>
+              <a:t>ường</a:t>
+            </a:r>
+            <a:r>
+              <a:rPr lang="en-GB" smtClean="0"/>
+              <a:t> </a:t>
+            </a:r>
+            <a:r>
+              <a:rPr lang="vi-VN" smtClean="0"/>
+              <a:t>để</a:t>
+            </a:r>
+            <a:r>
+              <a:rPr lang="en-GB" smtClean="0"/>
+              <a:t> null)</a:t>
+            </a:r>
+            <a:endParaRPr lang="en-GB"/>
+          </a:p>
+        </p:txBody>
+      </p:sp>
+      <p:sp>
+        <p:nvSpPr>
+          <p:cNvPr id="12" name="Rounded Rectangle 11"/>
+          <p:cNvSpPr/>
+          <p:nvPr/>
+        </p:nvSpPr>
+        <p:spPr>
+          <a:xfrm>
+            <a:off x="4623792" y="5013176"/>
+            <a:ext cx="1512168" cy="576064"/>
+          </a:xfrm>
+          <a:prstGeom prst="roundRect">
+            <a:avLst/>
+          </a:prstGeom>
+        </p:spPr>
+        <p:style>
+          <a:lnRef idx="2">
+            <a:schemeClr val="accent1">
+              <a:shade val="50000"/>
+            </a:schemeClr>
+          </a:lnRef>
+          <a:fillRef idx="1">
+            <a:schemeClr val="accent1"/>
+          </a:fillRef>
+          <a:effectRef idx="0">
+            <a:schemeClr val="accent1"/>
+          </a:effectRef>
+          <a:fontRef idx="minor">
+            <a:schemeClr val="lt1"/>
+          </a:fontRef>
+        </p:style>
+        <p:txBody>
+          <a:bodyPr rtlCol="0" anchor="ctr"/>
+          <a:lstStyle/>
+          <a:p>
+            <a:pPr algn="ctr"/>
+            <a:r>
+              <a:rPr lang="en-GB" smtClean="0"/>
+              <a:t>L</a:t>
+            </a:r>
+            <a:r>
+              <a:rPr lang="vi-VN" smtClean="0"/>
+              <a:t>ư</a:t>
+            </a:r>
+            <a:r>
+              <a:rPr lang="en-GB" smtClean="0"/>
+              <a:t>u</a:t>
+            </a:r>
+            <a:endParaRPr lang="en-GB"/>
+          </a:p>
+        </p:txBody>
+      </p:sp>
+      <p:sp>
+        <p:nvSpPr>
+          <p:cNvPr id="13" name="Rounded Rectangle 12"/>
+          <p:cNvSpPr/>
+          <p:nvPr/>
+        </p:nvSpPr>
+        <p:spPr>
+          <a:xfrm>
+            <a:off x="6423217" y="5013176"/>
+            <a:ext cx="1512168" cy="576064"/>
+          </a:xfrm>
+          <a:prstGeom prst="roundRect">
+            <a:avLst/>
+          </a:prstGeom>
+          <a:solidFill>
+            <a:srgbClr val="FFC000"/>
+          </a:solidFill>
+          <a:ln>
+            <a:noFill/>
+          </a:ln>
+        </p:spPr>
+        <p:style>
+          <a:lnRef idx="2">
+            <a:schemeClr val="accent1">
+              <a:shade val="50000"/>
+            </a:schemeClr>
+          </a:lnRef>
+          <a:fillRef idx="1">
+            <a:schemeClr val="accent1"/>
+          </a:fillRef>
+          <a:effectRef idx="0">
+            <a:schemeClr val="accent1"/>
+          </a:effectRef>
+          <a:fontRef idx="minor">
+            <a:schemeClr val="lt1"/>
+          </a:fontRef>
+        </p:style>
+        <p:txBody>
+          <a:bodyPr rtlCol="0" anchor="ctr"/>
+          <a:lstStyle/>
+          <a:p>
+            <a:pPr algn="ctr"/>
+            <a:r>
+              <a:rPr lang="en-GB" err="1"/>
+              <a:t>Huỷ</a:t>
+            </a:r>
+            <a:endParaRPr lang="en-GB"/>
+          </a:p>
+        </p:txBody>
+      </p:sp>
+      <p:sp>
+        <p:nvSpPr>
+          <p:cNvPr id="14" name="Rectangle 13"/>
+          <p:cNvSpPr/>
+          <p:nvPr/>
+        </p:nvSpPr>
+        <p:spPr>
+          <a:xfrm>
+            <a:off x="6084168" y="2204864"/>
+            <a:ext cx="1872208" cy="359278"/>
+          </a:xfrm>
+          <a:prstGeom prst="rect">
+            <a:avLst/>
+          </a:prstGeom>
+        </p:spPr>
+        <p:style>
+          <a:lnRef idx="2">
+            <a:schemeClr val="accent1">
+              <a:shade val="50000"/>
+            </a:schemeClr>
+          </a:lnRef>
+          <a:fillRef idx="1">
+            <a:schemeClr val="accent1"/>
+          </a:fillRef>
+          <a:effectRef idx="0">
+            <a:schemeClr val="accent1"/>
+          </a:effectRef>
+          <a:fontRef idx="minor">
+            <a:schemeClr val="lt1"/>
+          </a:fontRef>
+        </p:style>
+        <p:txBody>
+          <a:bodyPr rtlCol="0" anchor="ctr"/>
+          <a:lstStyle/>
+          <a:p>
+            <a:pPr algn="ctr"/>
+            <a:r>
+              <a:rPr lang="en-GB" smtClean="0"/>
+              <a:t>select-box </a:t>
+            </a:r>
+            <a:endParaRPr lang="en-GB"/>
+          </a:p>
+        </p:txBody>
+      </p:sp>
+      <p:sp>
+        <p:nvSpPr>
+          <p:cNvPr id="15" name="TextBox 14"/>
+          <p:cNvSpPr txBox="1"/>
+          <p:nvPr/>
+        </p:nvSpPr>
+        <p:spPr>
+          <a:xfrm>
+            <a:off x="2724409" y="2204864"/>
+            <a:ext cx="3024336" cy="369332"/>
+          </a:xfrm>
+          <a:prstGeom prst="rect">
+            <a:avLst/>
+          </a:prstGeom>
+          <a:noFill/>
+        </p:spPr>
+        <p:txBody>
+          <a:bodyPr wrap="square" rtlCol="0">
+            <a:spAutoFit/>
+          </a:bodyPr>
+          <a:lstStyle/>
+          <a:p>
+            <a:r>
+              <a:rPr lang="en-GB"/>
+              <a:t>Lĩnh vực </a:t>
+            </a:r>
+            <a:r>
+              <a:rPr lang="en-GB" smtClean="0"/>
+              <a:t>nghiên cứu con</a:t>
+            </a:r>
+            <a:endParaRPr lang="en-GB"/>
+          </a:p>
+        </p:txBody>
+      </p:sp>
+      <p:sp>
+        <p:nvSpPr>
+          <p:cNvPr id="16" name="Rectangle 15"/>
+          <p:cNvSpPr/>
+          <p:nvPr/>
+        </p:nvSpPr>
+        <p:spPr>
+          <a:xfrm>
+            <a:off x="6059551" y="1619508"/>
+            <a:ext cx="1872208" cy="359278"/>
+          </a:xfrm>
+          <a:prstGeom prst="rect">
+            <a:avLst/>
+          </a:prstGeom>
+        </p:spPr>
+        <p:style>
+          <a:lnRef idx="2">
+            <a:schemeClr val="accent1">
+              <a:shade val="50000"/>
+            </a:schemeClr>
+          </a:lnRef>
+          <a:fillRef idx="1">
+            <a:schemeClr val="accent1"/>
+          </a:fillRef>
+          <a:effectRef idx="0">
+            <a:schemeClr val="accent1"/>
+          </a:effectRef>
+          <a:fontRef idx="minor">
+            <a:schemeClr val="lt1"/>
+          </a:fontRef>
+        </p:style>
+        <p:txBody>
+          <a:bodyPr rtlCol="0" anchor="ctr"/>
+          <a:lstStyle/>
+          <a:p>
+            <a:pPr algn="ctr"/>
+            <a:r>
+              <a:rPr lang="en-GB" smtClean="0"/>
+              <a:t>select-box </a:t>
+            </a:r>
+            <a:endParaRPr lang="en-GB"/>
+          </a:p>
+        </p:txBody>
+      </p:sp>
+      <p:sp>
+        <p:nvSpPr>
+          <p:cNvPr id="17" name="TextBox 16"/>
+          <p:cNvSpPr txBox="1"/>
+          <p:nvPr/>
+        </p:nvSpPr>
+        <p:spPr>
+          <a:xfrm>
+            <a:off x="2699792" y="1619508"/>
+            <a:ext cx="3024336" cy="369332"/>
+          </a:xfrm>
+          <a:prstGeom prst="rect">
+            <a:avLst/>
+          </a:prstGeom>
+          <a:noFill/>
+        </p:spPr>
+        <p:txBody>
+          <a:bodyPr wrap="square" rtlCol="0">
+            <a:spAutoFit/>
+          </a:bodyPr>
+          <a:lstStyle/>
+          <a:p>
+            <a:r>
+              <a:rPr lang="en-GB"/>
+              <a:t>Lĩnh vực </a:t>
+            </a:r>
+            <a:r>
+              <a:rPr lang="en-GB"/>
+              <a:t>nghiên cứu</a:t>
+            </a:r>
+          </a:p>
+        </p:txBody>
+      </p:sp>
+    </p:spTree>
+    <p:extLst>
+      <p:ext uri="{BB962C8B-B14F-4D97-AF65-F5344CB8AC3E}">
+        <p14:creationId xmlns:p14="http://schemas.microsoft.com/office/powerpoint/2010/main" val="3239868056"/>
+      </p:ext>
+    </p:extLst>
+  </p:cSld>
+  <p:clrMapOvr>
+    <a:masterClrMapping/>
+  </p:clrMapOvr>
+</p:sld>
+</file>
+
+<file path=ppt/slides/slide25.xml><?xml version="1.0" encoding="utf-8"?>
 <p:sld xmlns:a="http://schemas.openxmlformats.org/drawingml/2006/main" xmlns:r="http://schemas.openxmlformats.org/officeDocument/2006/relationships" xmlns:p="http://schemas.openxmlformats.org/presentationml/2006/main">
   <p:cSld>
     <p:spTree>

</xml_diff>